<commit_message>
update pdf and ppt of hw1
</commit_message>
<xml_diff>
--- a/lecture/lecture1_llcao.pptx
+++ b/lecture/lecture1_llcao.pptx
@@ -8097,6 +8097,13 @@
       <p:transition spd="slow"/>
     </mc:Fallback>
   </mc:AlternateContent>
+  <p:timing>
+    <p:tnLst>
+      <p:par>
+        <p:cTn id="1" dur="indefinite" restart="never" nodeType="tmRoot"/>
+      </p:par>
+    </p:tnLst>
+  </p:timing>
 </p:sld>
 </file>
 
@@ -8447,6 +8454,13 @@
           </a:p>
           <a:p>
             <a:r>
+              <a:rPr lang="en-US" altLang="zh-CN" dirty="0" smtClean="0"/>
+              <a:t>Other choices:</a:t>
+            </a:r>
+          </a:p>
+          <a:p>
+            <a:pPr lvl="1"/>
+            <a:r>
               <a:rPr lang="en-US" altLang="zh-CN" dirty="0" err="1" smtClean="0"/>
               <a:t>Py</a:t>
             </a:r>
@@ -8456,30 +8470,19 @@
             </a:r>
             <a:r>
               <a:rPr lang="en-US" dirty="0" smtClean="0"/>
-              <a:t> (popular in speech. </a:t>
+              <a:t> (</a:t>
             </a:r>
             <a:r>
               <a:rPr lang="en-US" altLang="zh-CN" dirty="0" smtClean="0"/>
-              <a:t>By</a:t>
+              <a:t>Good</a:t>
             </a:r>
             <a:r>
               <a:rPr lang="zh-CN" altLang="en-US" dirty="0" smtClean="0"/>
               <a:t> </a:t>
             </a:r>
             <a:r>
-              <a:rPr lang="en-US" dirty="0" smtClean="0"/>
-              <a:t>Facebook FAIR</a:t>
-            </a:r>
-            <a:r>
               <a:rPr lang="en-US" altLang="zh-CN" dirty="0" smtClean="0"/>
-              <a:t>)</a:t>
-            </a:r>
-          </a:p>
-          <a:p>
-            <a:pPr lvl="1"/>
-            <a:r>
-              <a:rPr lang="en-US" altLang="zh-CN" dirty="0" smtClean="0"/>
-              <a:t>Good</a:t>
+              <a:t>for</a:t>
             </a:r>
             <a:r>
               <a:rPr lang="zh-CN" altLang="en-US" dirty="0" smtClean="0"/>
@@ -8487,67 +8490,23 @@
             </a:r>
             <a:r>
               <a:rPr lang="en-US" altLang="zh-CN" dirty="0" smtClean="0"/>
-              <a:t>for</a:t>
-            </a:r>
-            <a:r>
-              <a:rPr lang="zh-CN" altLang="en-US" dirty="0" smtClean="0"/>
+              <a:t>sequential research</a:t>
+            </a:r>
+            <a:r>
+              <a:rPr lang="en-US" altLang="zh-CN" dirty="0"/>
+              <a:t>)</a:t>
+            </a:r>
+            <a:endParaRPr lang="en-US" altLang="zh-CN" dirty="0" smtClean="0"/>
+          </a:p>
+          <a:p>
+            <a:pPr lvl="1"/>
+            <a:r>
+              <a:rPr lang="en-US" altLang="zh-CN" dirty="0" err="1" smtClean="0"/>
+              <a:t>MxNet</a:t>
+            </a:r>
+            <a:r>
+              <a:rPr lang="en-US" altLang="zh-CN" dirty="0" smtClean="0"/>
               <a:t> </a:t>
-            </a:r>
-            <a:r>
-              <a:rPr lang="en-US" altLang="zh-CN" dirty="0" smtClean="0"/>
-              <a:t>research</a:t>
-            </a:r>
-            <a:r>
-              <a:rPr lang="zh-CN" altLang="en-US" dirty="0" smtClean="0"/>
-              <a:t> </a:t>
-            </a:r>
-            <a:endParaRPr lang="en-US" altLang="zh-CN" dirty="0" smtClean="0"/>
-          </a:p>
-          <a:p>
-            <a:pPr lvl="1"/>
-            <a:r>
-              <a:rPr lang="en-US" altLang="zh-CN" dirty="0" smtClean="0"/>
-              <a:t>Potential</a:t>
-            </a:r>
-            <a:r>
-              <a:rPr lang="zh-CN" altLang="en-US" dirty="0" smtClean="0"/>
-              <a:t> </a:t>
-            </a:r>
-            <a:r>
-              <a:rPr lang="en-US" altLang="zh-CN" dirty="0" smtClean="0"/>
-              <a:t>support</a:t>
-            </a:r>
-            <a:r>
-              <a:rPr lang="zh-CN" altLang="en-US" dirty="0" smtClean="0"/>
-              <a:t> </a:t>
-            </a:r>
-            <a:r>
-              <a:rPr lang="en-US" altLang="zh-CN" dirty="0" smtClean="0"/>
-              <a:t>from</a:t>
-            </a:r>
-            <a:r>
-              <a:rPr lang="zh-CN" altLang="en-US" dirty="0" smtClean="0"/>
-              <a:t> </a:t>
-            </a:r>
-            <a:r>
-              <a:rPr lang="en-US" altLang="zh-CN" dirty="0" smtClean="0"/>
-              <a:t>Caffe2:</a:t>
-            </a:r>
-            <a:r>
-              <a:rPr lang="zh-CN" altLang="en-US" dirty="0" smtClean="0"/>
-              <a:t> </a:t>
-            </a:r>
-            <a:r>
-              <a:rPr lang="en-US" altLang="zh-CN" dirty="0" smtClean="0"/>
-              <a:t>object</a:t>
-            </a:r>
-            <a:r>
-              <a:rPr lang="zh-CN" altLang="en-US" dirty="0" smtClean="0"/>
-              <a:t> </a:t>
-            </a:r>
-            <a:r>
-              <a:rPr lang="en-US" altLang="zh-CN" dirty="0" smtClean="0"/>
-              <a:t>detection</a:t>
             </a:r>
             <a:endParaRPr lang="en-US" dirty="0" smtClean="0"/>
           </a:p>
@@ -8587,6 +8546,13 @@
   <p:clrMapOvr>
     <a:masterClrMapping/>
   </p:clrMapOvr>
+  <p:timing>
+    <p:tnLst>
+      <p:par>
+        <p:cTn id="1" dur="indefinite" restart="never" nodeType="tmRoot"/>
+      </p:par>
+    </p:tnLst>
+  </p:timing>
 </p:sld>
 </file>
 
@@ -8890,37 +8856,7 @@
               <a:rPr lang="en-US" dirty="0" smtClean="0">
                 <a:hlinkClick r:id="rId2"/>
               </a:rPr>
-              <a:t>AlphaGo </a:t>
-            </a:r>
-            <a:r>
-              <a:rPr lang="en-US" dirty="0" smtClean="0">
-                <a:hlinkClick r:id="rId3"/>
-              </a:rPr>
-              <a:t>Zero</a:t>
-            </a:r>
-            <a:r>
-              <a:rPr lang="zh-CN" altLang="en-US" dirty="0" smtClean="0">
-                <a:hlinkClick r:id="rId3"/>
-              </a:rPr>
-              <a:t> </a:t>
-            </a:r>
-            <a:r>
-              <a:rPr lang="en-US" altLang="zh-CN" dirty="0" smtClean="0">
-                <a:hlinkClick r:id="rId3"/>
-              </a:rPr>
-              <a:t>by</a:t>
-            </a:r>
-            <a:r>
-              <a:rPr lang="zh-CN" altLang="en-US" dirty="0" smtClean="0">
-                <a:hlinkClick r:id="rId3"/>
-              </a:rPr>
-              <a:t> </a:t>
-            </a:r>
-            <a:r>
-              <a:rPr lang="en-US" altLang="zh-CN" dirty="0" smtClean="0">
-                <a:hlinkClick r:id="rId3"/>
-              </a:rPr>
-              <a:t>David Silver</a:t>
+              <a:t>AlphaGo Zero by David Silver</a:t>
             </a:r>
             <a:endParaRPr lang="en-US" dirty="0" smtClean="0">
               <a:hlinkClick r:id="rId3"/>
@@ -9717,7 +9653,7 @@
               <a:t> </a:t>
             </a:r>
             <a:r>
-              <a:rPr lang="en-US" altLang="en-US" sz="2800" smtClean="0"/>
+              <a:rPr lang="en-US" altLang="en-US" sz="2800" dirty="0" smtClean="0"/>
               <a:t>Programming basics</a:t>
             </a:r>
             <a:endParaRPr lang="en-US" altLang="en-US" sz="2800" dirty="0"/>
@@ -11302,6 +11238,13 @@
   <p:clrMapOvr>
     <a:masterClrMapping/>
   </p:clrMapOvr>
+  <p:timing>
+    <p:tnLst>
+      <p:par>
+        <p:cTn id="1" dur="indefinite" restart="never" nodeType="tmRoot"/>
+      </p:par>
+    </p:tnLst>
+  </p:timing>
 </p:sld>
 </file>
 
@@ -11464,6 +11407,13 @@
   <p:clrMapOvr>
     <a:masterClrMapping/>
   </p:clrMapOvr>
+  <p:timing>
+    <p:tnLst>
+      <p:par>
+        <p:cTn id="1" dur="indefinite" restart="never" nodeType="tmRoot"/>
+      </p:par>
+    </p:tnLst>
+  </p:timing>
 </p:sld>
 </file>
 
@@ -11588,6 +11538,13 @@
   <p:clrMapOvr>
     <a:masterClrMapping/>
   </p:clrMapOvr>
+  <p:timing>
+    <p:tnLst>
+      <p:par>
+        <p:cTn id="1" dur="indefinite" restart="never" nodeType="tmRoot"/>
+      </p:par>
+    </p:tnLst>
+  </p:timing>
 </p:sld>
 </file>
 
@@ -12134,6 +12091,13 @@
   <p:clrMapOvr>
     <a:masterClrMapping/>
   </p:clrMapOvr>
+  <p:timing>
+    <p:tnLst>
+      <p:par>
+        <p:cTn id="1" dur="indefinite" restart="never" nodeType="tmRoot"/>
+      </p:par>
+    </p:tnLst>
+  </p:timing>
 </p:sld>
 </file>
 
@@ -12617,6 +12581,13 @@
   <p:clrMapOvr>
     <a:masterClrMapping/>
   </p:clrMapOvr>
+  <p:timing>
+    <p:tnLst>
+      <p:par>
+        <p:cTn id="1" dur="indefinite" restart="never" nodeType="tmRoot"/>
+      </p:par>
+    </p:tnLst>
+  </p:timing>
 </p:sld>
 </file>
 
@@ -13328,7 +13299,11 @@
             </a:r>
             <a:r>
               <a:rPr lang="en-US" i="0" dirty="0" smtClean="0"/>
-              <a:t>=(2, 1), </a:t>
+              <a:t>=(2</a:t>
+            </a:r>
+            <a:r>
+              <a:rPr lang="en-US" i="0" dirty="0" smtClean="0"/>
+              <a:t>, 1), </a:t>
             </a:r>
             <a:r>
               <a:rPr lang="en-US" i="0" dirty="0" err="1"/>
@@ -13366,6 +13341,13 @@
   <p:clrMapOvr>
     <a:masterClrMapping/>
   </p:clrMapOvr>
+  <p:timing>
+    <p:tnLst>
+      <p:par>
+        <p:cTn id="1" dur="indefinite" restart="never" nodeType="tmRoot"/>
+      </p:par>
+    </p:tnLst>
+  </p:timing>
 </p:sld>
 </file>
 
@@ -14066,6 +14048,13 @@
   <p:clrMapOvr>
     <a:masterClrMapping/>
   </p:clrMapOvr>
+  <p:timing>
+    <p:tnLst>
+      <p:par>
+        <p:cTn id="1" dur="indefinite" restart="never" nodeType="tmRoot"/>
+      </p:par>
+    </p:tnLst>
+  </p:timing>
 </p:sld>
 </file>
 
@@ -14669,6 +14658,13 @@
   <p:clrMapOvr>
     <a:masterClrMapping/>
   </p:clrMapOvr>
+  <p:timing>
+    <p:tnLst>
+      <p:par>
+        <p:cTn id="1" dur="indefinite" restart="never" nodeType="tmRoot"/>
+      </p:par>
+    </p:tnLst>
+  </p:timing>
 </p:sld>
 </file>
 
@@ -14776,8 +14772,12 @@
           </a:p>
           <a:p>
             <a:r>
+              <a:rPr lang="en-US" b="1" dirty="0" smtClean="0"/>
+              <a:t>Please drop early </a:t>
+            </a:r>
+            <a:r>
               <a:rPr lang="en-US" dirty="0" smtClean="0"/>
-              <a:t>Please drop early if you cannot finish HW#1 or do not follow</a:t>
+              <a:t>if you cannot follow or finish HW#1</a:t>
             </a:r>
             <a:endParaRPr lang="en-US" dirty="0" smtClean="0"/>
           </a:p>
@@ -15107,6 +15107,13 @@
   <p:clrMapOvr>
     <a:masterClrMapping/>
   </p:clrMapOvr>
+  <p:timing>
+    <p:tnLst>
+      <p:par>
+        <p:cTn id="1" dur="indefinite" restart="never" nodeType="tmRoot"/>
+      </p:par>
+    </p:tnLst>
+  </p:timing>
 </p:sld>
 </file>
 
@@ -15284,6 +15291,13 @@
   <p:clrMapOvr>
     <a:masterClrMapping/>
   </p:clrMapOvr>
+  <p:timing>
+    <p:tnLst>
+      <p:par>
+        <p:cTn id="1" dur="indefinite" restart="never" nodeType="tmRoot"/>
+      </p:par>
+    </p:tnLst>
+  </p:timing>
 </p:sld>
 </file>
 
@@ -15931,6 +15945,13 @@
   <p:clrMapOvr>
     <a:masterClrMapping/>
   </p:clrMapOvr>
+  <p:timing>
+    <p:tnLst>
+      <p:par>
+        <p:cTn id="1" dur="indefinite" restart="never" nodeType="tmRoot"/>
+      </p:par>
+    </p:tnLst>
+  </p:timing>
 </p:sld>
 </file>
 
@@ -16021,101 +16042,38 @@
               <a:buNone/>
             </a:pPr>
             <a:r>
-              <a:rPr lang="en-US" sz="1800" dirty="0">
-                <a:solidFill>
-                  <a:schemeClr val="tx1">
-                    <a:lumMod val="50000"/>
-                    <a:lumOff val="50000"/>
-                  </a:schemeClr>
-                </a:solidFill>
-              </a:rPr>
+              <a:rPr lang="en-US" sz="1800" dirty="0"/>
               <a:t>import </a:t>
             </a:r>
             <a:r>
-              <a:rPr lang="en-US" sz="1800" dirty="0" err="1">
-                <a:solidFill>
-                  <a:schemeClr val="tx1">
-                    <a:lumMod val="50000"/>
-                    <a:lumOff val="50000"/>
-                  </a:schemeClr>
-                </a:solidFill>
-              </a:rPr>
+              <a:rPr lang="en-US" sz="1800" dirty="0" err="1"/>
               <a:t>tensorflow</a:t>
             </a:r>
             <a:r>
-              <a:rPr lang="en-US" sz="1800" dirty="0">
-                <a:solidFill>
-                  <a:schemeClr val="tx1">
-                    <a:lumMod val="50000"/>
-                    <a:lumOff val="50000"/>
-                  </a:schemeClr>
-                </a:solidFill>
-              </a:rPr>
+              <a:rPr lang="en-US" sz="1800" dirty="0"/>
               <a:t> as </a:t>
             </a:r>
             <a:r>
-              <a:rPr lang="en-US" sz="1800" dirty="0" err="1">
-                <a:solidFill>
-                  <a:schemeClr val="tx1">
-                    <a:lumMod val="50000"/>
-                    <a:lumOff val="50000"/>
-                  </a:schemeClr>
-                </a:solidFill>
-              </a:rPr>
+              <a:rPr lang="en-US" sz="1800" dirty="0" err="1"/>
               <a:t>tf</a:t>
             </a:r>
             <a:r>
-              <a:rPr lang="en-US" sz="1800" dirty="0">
-                <a:solidFill>
-                  <a:schemeClr val="tx1">
-                    <a:lumMod val="50000"/>
-                    <a:lumOff val="50000"/>
-                  </a:schemeClr>
-                </a:solidFill>
-              </a:rPr>
+              <a:rPr lang="en-US" sz="1800" dirty="0"/>
               <a:t/>
             </a:r>
             <a:br>
-              <a:rPr lang="en-US" sz="1800" dirty="0">
-                <a:solidFill>
-                  <a:schemeClr val="tx1">
-                    <a:lumMod val="50000"/>
-                    <a:lumOff val="50000"/>
-                  </a:schemeClr>
-                </a:solidFill>
-              </a:rPr>
+              <a:rPr lang="en-US" sz="1800" dirty="0"/>
             </a:br>
             <a:r>
-              <a:rPr lang="en-US" sz="1800" dirty="0">
-                <a:solidFill>
-                  <a:schemeClr val="tx1">
-                    <a:lumMod val="50000"/>
-                    <a:lumOff val="50000"/>
-                  </a:schemeClr>
-                </a:solidFill>
-              </a:rPr>
+              <a:rPr lang="en-US" sz="1800" dirty="0"/>
               <a:t>X = </a:t>
             </a:r>
             <a:r>
-              <a:rPr lang="en-US" sz="1800" dirty="0" err="1">
-                <a:solidFill>
-                  <a:schemeClr val="tx1">
-                    <a:lumMod val="50000"/>
-                    <a:lumOff val="50000"/>
-                  </a:schemeClr>
-                </a:solidFill>
-              </a:rPr>
+              <a:rPr lang="en-US" sz="1800" dirty="0" err="1"/>
               <a:t>tf.placeholder</a:t>
             </a:r>
             <a:r>
-              <a:rPr lang="en-US" sz="1800" dirty="0">
-                <a:solidFill>
-                  <a:schemeClr val="tx1">
-                    <a:lumMod val="50000"/>
-                    <a:lumOff val="50000"/>
-                  </a:schemeClr>
-                </a:solidFill>
-              </a:rPr>
+              <a:rPr lang="en-US" sz="1800" dirty="0"/>
               <a:t>(tf.float32, name='X')</a:t>
             </a:r>
           </a:p>
@@ -16124,36 +16082,15 @@
               <a:buNone/>
             </a:pPr>
             <a:r>
-              <a:rPr lang="en-US" sz="1800" dirty="0">
-                <a:solidFill>
-                  <a:schemeClr val="tx1">
-                    <a:lumMod val="50000"/>
-                    <a:lumOff val="50000"/>
-                  </a:schemeClr>
-                </a:solidFill>
-              </a:rPr>
+              <a:rPr lang="en-US" sz="1800" dirty="0"/>
               <a:t>Y = </a:t>
             </a:r>
             <a:r>
-              <a:rPr lang="en-US" sz="1800" dirty="0" err="1">
-                <a:solidFill>
-                  <a:schemeClr val="tx1">
-                    <a:lumMod val="50000"/>
-                    <a:lumOff val="50000"/>
-                  </a:schemeClr>
-                </a:solidFill>
-              </a:rPr>
+              <a:rPr lang="en-US" sz="1800" dirty="0" err="1"/>
               <a:t>tf.placeholder</a:t>
             </a:r>
             <a:r>
-              <a:rPr lang="en-US" sz="1800" dirty="0">
-                <a:solidFill>
-                  <a:schemeClr val="tx1">
-                    <a:lumMod val="50000"/>
-                    <a:lumOff val="50000"/>
-                  </a:schemeClr>
-                </a:solidFill>
-              </a:rPr>
+              <a:rPr lang="en-US" sz="1800" dirty="0"/>
               <a:t>(tf.float32, name='Y')</a:t>
             </a:r>
           </a:p>
@@ -16162,79 +16099,30 @@
               <a:buNone/>
             </a:pPr>
             <a:r>
-              <a:rPr lang="en-US" sz="1800" dirty="0">
-                <a:solidFill>
-                  <a:schemeClr val="tx1">
-                    <a:lumMod val="50000"/>
-                    <a:lumOff val="50000"/>
-                  </a:schemeClr>
-                </a:solidFill>
-              </a:rPr>
+              <a:rPr lang="en-US" sz="1800" dirty="0"/>
               <a:t/>
             </a:r>
             <a:br>
-              <a:rPr lang="en-US" sz="1800" dirty="0">
-                <a:solidFill>
-                  <a:schemeClr val="tx1">
-                    <a:lumMod val="50000"/>
-                    <a:lumOff val="50000"/>
-                  </a:schemeClr>
-                </a:solidFill>
-              </a:rPr>
+              <a:rPr lang="en-US" sz="1800" dirty="0"/>
             </a:br>
             <a:r>
-              <a:rPr lang="en-US" sz="1800" dirty="0">
-                <a:solidFill>
-                  <a:schemeClr val="tx1">
-                    <a:lumMod val="50000"/>
-                    <a:lumOff val="50000"/>
-                  </a:schemeClr>
-                </a:solidFill>
-              </a:rPr>
+              <a:rPr lang="en-US" sz="1800" dirty="0"/>
               <a:t>w = </a:t>
             </a:r>
             <a:r>
-              <a:rPr lang="en-US" sz="1800" dirty="0" err="1">
-                <a:solidFill>
-                  <a:schemeClr val="tx1">
-                    <a:lumMod val="50000"/>
-                    <a:lumOff val="50000"/>
-                  </a:schemeClr>
-                </a:solidFill>
-              </a:rPr>
+              <a:rPr lang="en-US" sz="1800" dirty="0" err="1"/>
               <a:t>tf.get_variable</a:t>
             </a:r>
             <a:r>
-              <a:rPr lang="en-US" sz="1800" dirty="0">
-                <a:solidFill>
-                  <a:schemeClr val="tx1">
-                    <a:lumMod val="50000"/>
-                    <a:lumOff val="50000"/>
-                  </a:schemeClr>
-                </a:solidFill>
-              </a:rPr>
+              <a:rPr lang="en-US" sz="1800" dirty="0"/>
               <a:t>('weights', initializer=</a:t>
             </a:r>
             <a:r>
-              <a:rPr lang="en-US" sz="1800" dirty="0" err="1">
-                <a:solidFill>
-                  <a:schemeClr val="tx1">
-                    <a:lumMod val="50000"/>
-                    <a:lumOff val="50000"/>
-                  </a:schemeClr>
-                </a:solidFill>
-              </a:rPr>
+              <a:rPr lang="en-US" sz="1800" dirty="0" err="1"/>
               <a:t>tf.constant</a:t>
             </a:r>
             <a:r>
-              <a:rPr lang="en-US" sz="1800" dirty="0">
-                <a:solidFill>
-                  <a:schemeClr val="tx1">
-                    <a:lumMod val="50000"/>
-                    <a:lumOff val="50000"/>
-                  </a:schemeClr>
-                </a:solidFill>
-              </a:rPr>
+              <a:rPr lang="en-US" sz="1800" dirty="0"/>
               <a:t>(0.0))</a:t>
             </a:r>
           </a:p>
@@ -16243,58 +16131,23 @@
               <a:buNone/>
             </a:pPr>
             <a:r>
-              <a:rPr lang="en-US" sz="1800" dirty="0">
-                <a:solidFill>
-                  <a:schemeClr val="tx1">
-                    <a:lumMod val="50000"/>
-                    <a:lumOff val="50000"/>
-                  </a:schemeClr>
-                </a:solidFill>
-              </a:rPr>
+              <a:rPr lang="en-US" sz="1800" dirty="0"/>
               <a:t>b = </a:t>
             </a:r>
             <a:r>
-              <a:rPr lang="en-US" sz="1800" dirty="0" err="1">
-                <a:solidFill>
-                  <a:schemeClr val="tx1">
-                    <a:lumMod val="50000"/>
-                    <a:lumOff val="50000"/>
-                  </a:schemeClr>
-                </a:solidFill>
-              </a:rPr>
+              <a:rPr lang="en-US" sz="1800" dirty="0" err="1"/>
               <a:t>tf.get_variable</a:t>
             </a:r>
             <a:r>
-              <a:rPr lang="en-US" sz="1800" dirty="0">
-                <a:solidFill>
-                  <a:schemeClr val="tx1">
-                    <a:lumMod val="50000"/>
-                    <a:lumOff val="50000"/>
-                  </a:schemeClr>
-                </a:solidFill>
-              </a:rPr>
+              <a:rPr lang="en-US" sz="1800" dirty="0"/>
               <a:t>('bias', initializer=</a:t>
             </a:r>
             <a:r>
-              <a:rPr lang="en-US" sz="1800" dirty="0" err="1">
-                <a:solidFill>
-                  <a:schemeClr val="tx1">
-                    <a:lumMod val="50000"/>
-                    <a:lumOff val="50000"/>
-                  </a:schemeClr>
-                </a:solidFill>
-              </a:rPr>
+              <a:rPr lang="en-US" sz="1800" dirty="0" err="1"/>
               <a:t>tf.constant</a:t>
             </a:r>
             <a:r>
-              <a:rPr lang="en-US" sz="1800" dirty="0">
-                <a:solidFill>
-                  <a:schemeClr val="tx1">
-                    <a:lumMod val="50000"/>
-                    <a:lumOff val="50000"/>
-                  </a:schemeClr>
-                </a:solidFill>
-              </a:rPr>
+              <a:rPr lang="en-US" sz="1800" dirty="0"/>
               <a:t>(0.0))</a:t>
             </a:r>
           </a:p>
@@ -16303,46 +16156,18 @@
               <a:buNone/>
             </a:pPr>
             <a:r>
-              <a:rPr lang="en-US" sz="1800" dirty="0">
-                <a:solidFill>
-                  <a:schemeClr val="tx1">
-                    <a:lumMod val="50000"/>
-                    <a:lumOff val="50000"/>
-                  </a:schemeClr>
-                </a:solidFill>
-              </a:rPr>
+              <a:rPr lang="en-US" sz="1800" dirty="0"/>
               <a:t/>
             </a:r>
             <a:br>
-              <a:rPr lang="en-US" sz="1800" dirty="0">
-                <a:solidFill>
-                  <a:schemeClr val="tx1">
-                    <a:lumMod val="50000"/>
-                    <a:lumOff val="50000"/>
-                  </a:schemeClr>
-                </a:solidFill>
-              </a:rPr>
+              <a:rPr lang="en-US" sz="1800" dirty="0"/>
             </a:br>
             <a:r>
-              <a:rPr lang="en-US" sz="1800" dirty="0" err="1">
-                <a:solidFill>
-                  <a:schemeClr val="tx1">
-                    <a:lumMod val="50000"/>
-                    <a:lumOff val="50000"/>
-                  </a:schemeClr>
-                </a:solidFill>
-              </a:rPr>
+              <a:rPr lang="en-US" sz="1800" dirty="0" err="1"/>
               <a:t>Y_predicted</a:t>
             </a:r>
             <a:r>
-              <a:rPr lang="en-US" sz="1800" dirty="0">
-                <a:solidFill>
-                  <a:schemeClr val="tx1">
-                    <a:lumMod val="50000"/>
-                    <a:lumOff val="50000"/>
-                  </a:schemeClr>
-                </a:solidFill>
-              </a:rPr>
+              <a:rPr lang="en-US" sz="1800" dirty="0"/>
               <a:t> = w * X + b </a:t>
             </a:r>
           </a:p>
@@ -16351,58 +16176,23 @@
               <a:buNone/>
             </a:pPr>
             <a:r>
-              <a:rPr lang="en-US" sz="1800" dirty="0">
-                <a:solidFill>
-                  <a:schemeClr val="tx1">
-                    <a:lumMod val="50000"/>
-                    <a:lumOff val="50000"/>
-                  </a:schemeClr>
-                </a:solidFill>
-              </a:rPr>
+              <a:rPr lang="en-US" sz="1800" dirty="0"/>
               <a:t>loss = </a:t>
             </a:r>
             <a:r>
-              <a:rPr lang="en-US" sz="1800" dirty="0" err="1">
-                <a:solidFill>
-                  <a:schemeClr val="tx1">
-                    <a:lumMod val="50000"/>
-                    <a:lumOff val="50000"/>
-                  </a:schemeClr>
-                </a:solidFill>
-              </a:rPr>
+              <a:rPr lang="en-US" sz="1800" dirty="0" err="1"/>
               <a:t>tf.square</a:t>
             </a:r>
             <a:r>
-              <a:rPr lang="en-US" sz="1800" dirty="0">
-                <a:solidFill>
-                  <a:schemeClr val="tx1">
-                    <a:lumMod val="50000"/>
-                    <a:lumOff val="50000"/>
-                  </a:schemeClr>
-                </a:solidFill>
-              </a:rPr>
+              <a:rPr lang="en-US" sz="1800" dirty="0"/>
               <a:t>(Y - </a:t>
             </a:r>
             <a:r>
-              <a:rPr lang="en-US" sz="1800" dirty="0" err="1">
-                <a:solidFill>
-                  <a:schemeClr val="tx1">
-                    <a:lumMod val="50000"/>
-                    <a:lumOff val="50000"/>
-                  </a:schemeClr>
-                </a:solidFill>
-              </a:rPr>
+              <a:rPr lang="en-US" sz="1800" dirty="0" err="1"/>
               <a:t>Y_predicted</a:t>
             </a:r>
             <a:r>
-              <a:rPr lang="en-US" sz="1800" dirty="0">
-                <a:solidFill>
-                  <a:schemeClr val="tx1">
-                    <a:lumMod val="50000"/>
-                    <a:lumOff val="50000"/>
-                  </a:schemeClr>
-                </a:solidFill>
-              </a:rPr>
+              <a:rPr lang="en-US" sz="1800" dirty="0"/>
               <a:t>, name='loss')</a:t>
             </a:r>
           </a:p>
@@ -16411,58 +16201,23 @@
               <a:buNone/>
             </a:pPr>
             <a:r>
-              <a:rPr lang="en-US" sz="1800" dirty="0">
-                <a:solidFill>
-                  <a:schemeClr val="tx1">
-                    <a:lumMod val="50000"/>
-                    <a:lumOff val="50000"/>
-                  </a:schemeClr>
-                </a:solidFill>
-              </a:rPr>
+              <a:rPr lang="en-US" sz="1800" dirty="0"/>
               <a:t>optimizer = </a:t>
             </a:r>
             <a:r>
-              <a:rPr lang="en-US" sz="1800" dirty="0" err="1">
-                <a:solidFill>
-                  <a:schemeClr val="tx1">
-                    <a:lumMod val="50000"/>
-                    <a:lumOff val="50000"/>
-                  </a:schemeClr>
-                </a:solidFill>
-              </a:rPr>
+              <a:rPr lang="en-US" sz="1800" dirty="0" err="1"/>
               <a:t>tf.train.GradientDescentOptimizer</a:t>
             </a:r>
             <a:r>
-              <a:rPr lang="en-US" sz="1800" dirty="0">
-                <a:solidFill>
-                  <a:schemeClr val="tx1">
-                    <a:lumMod val="50000"/>
-                    <a:lumOff val="50000"/>
-                  </a:schemeClr>
-                </a:solidFill>
-              </a:rPr>
+              <a:rPr lang="en-US" sz="1800" dirty="0"/>
               <a:t>(</a:t>
             </a:r>
             <a:r>
-              <a:rPr lang="en-US" sz="1800" dirty="0" err="1">
-                <a:solidFill>
-                  <a:schemeClr val="tx1">
-                    <a:lumMod val="50000"/>
-                    <a:lumOff val="50000"/>
-                  </a:schemeClr>
-                </a:solidFill>
-              </a:rPr>
+              <a:rPr lang="en-US" sz="1800" dirty="0" err="1"/>
               <a:t>learning_rate</a:t>
             </a:r>
             <a:r>
-              <a:rPr lang="en-US" sz="1800" dirty="0">
-                <a:solidFill>
-                  <a:schemeClr val="tx1">
-                    <a:lumMod val="50000"/>
-                    <a:lumOff val="50000"/>
-                  </a:schemeClr>
-                </a:solidFill>
-              </a:rPr>
+              <a:rPr lang="en-US" sz="1800" dirty="0"/>
               <a:t>=0.001).minimize(loss)</a:t>
             </a:r>
           </a:p>
@@ -16471,58 +16226,23 @@
               <a:buNone/>
             </a:pPr>
             <a:r>
-              <a:rPr lang="en-US" sz="1800" dirty="0">
-                <a:solidFill>
-                  <a:schemeClr val="tx1">
-                    <a:lumMod val="50000"/>
-                    <a:lumOff val="50000"/>
-                  </a:schemeClr>
-                </a:solidFill>
-              </a:rPr>
+              <a:rPr lang="en-US" sz="1800" dirty="0"/>
               <a:t>with </a:t>
             </a:r>
             <a:r>
-              <a:rPr lang="en-US" sz="1800" dirty="0" err="1">
-                <a:solidFill>
-                  <a:schemeClr val="tx1">
-                    <a:lumMod val="50000"/>
-                    <a:lumOff val="50000"/>
-                  </a:schemeClr>
-                </a:solidFill>
-              </a:rPr>
+              <a:rPr lang="en-US" sz="1800" dirty="0" err="1"/>
               <a:t>tf.Session</a:t>
             </a:r>
             <a:r>
-              <a:rPr lang="en-US" sz="1800" dirty="0">
-                <a:solidFill>
-                  <a:schemeClr val="tx1">
-                    <a:lumMod val="50000"/>
-                    <a:lumOff val="50000"/>
-                  </a:schemeClr>
-                </a:solidFill>
-              </a:rPr>
+              <a:rPr lang="en-US" sz="1800" dirty="0"/>
               <a:t>() as </a:t>
             </a:r>
             <a:r>
-              <a:rPr lang="en-US" sz="1800" dirty="0" err="1">
-                <a:solidFill>
-                  <a:schemeClr val="tx1">
-                    <a:lumMod val="50000"/>
-                    <a:lumOff val="50000"/>
-                  </a:schemeClr>
-                </a:solidFill>
-              </a:rPr>
+              <a:rPr lang="en-US" sz="1800" dirty="0" err="1"/>
               <a:t>sess</a:t>
             </a:r>
             <a:r>
-              <a:rPr lang="en-US" sz="1800" dirty="0">
-                <a:solidFill>
-                  <a:schemeClr val="tx1">
-                    <a:lumMod val="50000"/>
-                    <a:lumOff val="50000"/>
-                  </a:schemeClr>
-                </a:solidFill>
-              </a:rPr>
+              <a:rPr lang="en-US" sz="1800" dirty="0"/>
               <a:t>:</a:t>
             </a:r>
           </a:p>
@@ -16531,58 +16251,23 @@
               <a:buNone/>
             </a:pPr>
             <a:r>
-              <a:rPr lang="en-US" sz="1800" dirty="0">
-                <a:solidFill>
-                  <a:schemeClr val="tx1">
-                    <a:lumMod val="50000"/>
-                    <a:lumOff val="50000"/>
-                  </a:schemeClr>
-                </a:solidFill>
-              </a:rPr>
+              <a:rPr lang="en-US" sz="1800" dirty="0"/>
               <a:t>         </a:t>
             </a:r>
             <a:r>
-              <a:rPr lang="en-US" sz="1800" dirty="0" err="1">
-                <a:solidFill>
-                  <a:schemeClr val="tx1">
-                    <a:lumMod val="50000"/>
-                    <a:lumOff val="50000"/>
-                  </a:schemeClr>
-                </a:solidFill>
-              </a:rPr>
+              <a:rPr lang="en-US" sz="1800" dirty="0" err="1"/>
               <a:t>sess.run</a:t>
             </a:r>
             <a:r>
-              <a:rPr lang="en-US" sz="1800" dirty="0">
-                <a:solidFill>
-                  <a:schemeClr val="tx1">
-                    <a:lumMod val="50000"/>
-                    <a:lumOff val="50000"/>
-                  </a:schemeClr>
-                </a:solidFill>
-              </a:rPr>
+              <a:rPr lang="en-US" sz="1800" dirty="0"/>
               <a:t>(</a:t>
             </a:r>
             <a:r>
-              <a:rPr lang="en-US" sz="1800" dirty="0" err="1">
-                <a:solidFill>
-                  <a:schemeClr val="tx1">
-                    <a:lumMod val="50000"/>
-                    <a:lumOff val="50000"/>
-                  </a:schemeClr>
-                </a:solidFill>
-              </a:rPr>
+              <a:rPr lang="en-US" sz="1800" dirty="0" err="1"/>
               <a:t>tf.global_variables_initializer</a:t>
             </a:r>
             <a:r>
-              <a:rPr lang="en-US" sz="1800" dirty="0">
-                <a:solidFill>
-                  <a:schemeClr val="tx1">
-                    <a:lumMod val="50000"/>
-                    <a:lumOff val="50000"/>
-                  </a:schemeClr>
-                </a:solidFill>
-              </a:rPr>
+              <a:rPr lang="en-US" sz="1800" dirty="0"/>
               <a:t>()) </a:t>
             </a:r>
           </a:p>
@@ -16591,36 +16276,15 @@
               <a:buNone/>
             </a:pPr>
             <a:r>
-              <a:rPr lang="en-US" sz="1800" dirty="0">
-                <a:solidFill>
-                  <a:schemeClr val="tx1">
-                    <a:lumMod val="50000"/>
-                    <a:lumOff val="50000"/>
-                  </a:schemeClr>
-                </a:solidFill>
-              </a:rPr>
+              <a:rPr lang="en-US" sz="1800" dirty="0"/>
               <a:t>         for </a:t>
             </a:r>
             <a:r>
-              <a:rPr lang="en-US" sz="1800" dirty="0" err="1">
-                <a:solidFill>
-                  <a:schemeClr val="tx1">
-                    <a:lumMod val="50000"/>
-                    <a:lumOff val="50000"/>
-                  </a:schemeClr>
-                </a:solidFill>
-              </a:rPr>
+              <a:rPr lang="en-US" sz="1800" dirty="0" err="1"/>
               <a:t>i</a:t>
             </a:r>
             <a:r>
-              <a:rPr lang="en-US" sz="1800" dirty="0">
-                <a:solidFill>
-                  <a:schemeClr val="tx1">
-                    <a:lumMod val="50000"/>
-                    <a:lumOff val="50000"/>
-                  </a:schemeClr>
-                </a:solidFill>
-              </a:rPr>
+              <a:rPr lang="en-US" sz="1800" dirty="0"/>
               <a:t> in range(100): # run 100 epochs</a:t>
             </a:r>
           </a:p>
@@ -16629,14 +16293,7 @@
               <a:buNone/>
             </a:pPr>
             <a:r>
-              <a:rPr lang="en-US" sz="1800" dirty="0">
-                <a:solidFill>
-                  <a:schemeClr val="tx1">
-                    <a:lumMod val="50000"/>
-                    <a:lumOff val="50000"/>
-                  </a:schemeClr>
-                </a:solidFill>
-              </a:rPr>
+              <a:rPr lang="en-US" sz="1800" dirty="0"/>
               <a:t>	for x, y in data:</a:t>
             </a:r>
           </a:p>
@@ -16645,80 +16302,31 @@
               <a:buNone/>
             </a:pPr>
             <a:r>
-              <a:rPr lang="en-US" sz="1800" dirty="0">
-                <a:solidFill>
-                  <a:schemeClr val="tx1">
-                    <a:lumMod val="50000"/>
-                    <a:lumOff val="50000"/>
-                  </a:schemeClr>
-                </a:solidFill>
-              </a:rPr>
+              <a:rPr lang="en-US" sz="1800" dirty="0"/>
               <a:t>	       </a:t>
             </a:r>
             <a:r>
-              <a:rPr lang="en-US" sz="1800" dirty="0" err="1">
-                <a:solidFill>
-                  <a:schemeClr val="tx1">
-                    <a:lumMod val="50000"/>
-                    <a:lumOff val="50000"/>
-                  </a:schemeClr>
-                </a:solidFill>
-              </a:rPr>
+              <a:rPr lang="en-US" sz="1800" dirty="0" err="1"/>
               <a:t>sess.run</a:t>
             </a:r>
             <a:r>
-              <a:rPr lang="en-US" sz="1800" dirty="0">
-                <a:solidFill>
-                  <a:schemeClr val="tx1">
-                    <a:lumMod val="50000"/>
-                    <a:lumOff val="50000"/>
-                  </a:schemeClr>
-                </a:solidFill>
-              </a:rPr>
+              <a:rPr lang="en-US" sz="1800" dirty="0"/>
               <a:t>(optimizer, </a:t>
             </a:r>
             <a:r>
-              <a:rPr lang="en-US" sz="1800" dirty="0" err="1">
-                <a:solidFill>
-                  <a:schemeClr val="tx1">
-                    <a:lumMod val="50000"/>
-                    <a:lumOff val="50000"/>
-                  </a:schemeClr>
-                </a:solidFill>
-              </a:rPr>
+              <a:rPr lang="en-US" sz="1800" dirty="0" err="1"/>
               <a:t>feed_dict</a:t>
             </a:r>
             <a:r>
-              <a:rPr lang="en-US" sz="1800" dirty="0">
-                <a:solidFill>
-                  <a:schemeClr val="tx1">
-                    <a:lumMod val="50000"/>
-                    <a:lumOff val="50000"/>
-                  </a:schemeClr>
-                </a:solidFill>
-              </a:rPr>
+              <a:rPr lang="en-US" sz="1800" dirty="0"/>
               <a:t>={X: x, </a:t>
             </a:r>
             <a:r>
-              <a:rPr lang="en-US" sz="1800" dirty="0" err="1">
-                <a:solidFill>
-                  <a:schemeClr val="tx1">
-                    <a:lumMod val="50000"/>
-                    <a:lumOff val="50000"/>
-                  </a:schemeClr>
-                </a:solidFill>
-              </a:rPr>
+              <a:rPr lang="en-US" sz="1800" dirty="0" err="1"/>
               <a:t>Y:y</a:t>
             </a:r>
             <a:r>
-              <a:rPr lang="en-US" sz="1800" dirty="0">
-                <a:solidFill>
-                  <a:schemeClr val="tx1">
-                    <a:lumMod val="50000"/>
-                    <a:lumOff val="50000"/>
-                  </a:schemeClr>
-                </a:solidFill>
-              </a:rPr>
+              <a:rPr lang="en-US" sz="1800" dirty="0"/>
               <a:t>}) </a:t>
             </a:r>
           </a:p>
@@ -16727,80 +16335,31 @@
               <a:buNone/>
             </a:pPr>
             <a:r>
-              <a:rPr lang="en-US" sz="1800" dirty="0">
-                <a:solidFill>
-                  <a:schemeClr val="tx1">
-                    <a:lumMod val="50000"/>
-                    <a:lumOff val="50000"/>
-                  </a:schemeClr>
-                </a:solidFill>
-              </a:rPr>
+              <a:rPr lang="en-US" sz="1800" dirty="0"/>
               <a:t>         </a:t>
             </a:r>
             <a:r>
-              <a:rPr lang="en-US" sz="1800" dirty="0" err="1">
-                <a:solidFill>
-                  <a:schemeClr val="tx1">
-                    <a:lumMod val="50000"/>
-                    <a:lumOff val="50000"/>
-                  </a:schemeClr>
-                </a:solidFill>
-              </a:rPr>
+              <a:rPr lang="en-US" sz="1800" dirty="0" err="1"/>
               <a:t>w_out</a:t>
             </a:r>
             <a:r>
-              <a:rPr lang="en-US" sz="1800" dirty="0">
-                <a:solidFill>
-                  <a:schemeClr val="tx1">
-                    <a:lumMod val="50000"/>
-                    <a:lumOff val="50000"/>
-                  </a:schemeClr>
-                </a:solidFill>
-              </a:rPr>
+              <a:rPr lang="en-US" sz="1800" dirty="0"/>
               <a:t>, </a:t>
             </a:r>
             <a:r>
-              <a:rPr lang="en-US" sz="1800" dirty="0" err="1">
-                <a:solidFill>
-                  <a:schemeClr val="tx1">
-                    <a:lumMod val="50000"/>
-                    <a:lumOff val="50000"/>
-                  </a:schemeClr>
-                </a:solidFill>
-              </a:rPr>
+              <a:rPr lang="en-US" sz="1800" dirty="0" err="1"/>
               <a:t>b_out</a:t>
             </a:r>
             <a:r>
-              <a:rPr lang="en-US" sz="1800" dirty="0">
-                <a:solidFill>
-                  <a:schemeClr val="tx1">
-                    <a:lumMod val="50000"/>
-                    <a:lumOff val="50000"/>
-                  </a:schemeClr>
-                </a:solidFill>
-              </a:rPr>
+              <a:rPr lang="en-US" sz="1800" dirty="0"/>
               <a:t> = </a:t>
             </a:r>
             <a:r>
-              <a:rPr lang="en-US" sz="1800" dirty="0" err="1">
-                <a:solidFill>
-                  <a:schemeClr val="tx1">
-                    <a:lumMod val="50000"/>
-                    <a:lumOff val="50000"/>
-                  </a:schemeClr>
-                </a:solidFill>
-              </a:rPr>
+              <a:rPr lang="en-US" sz="1800" dirty="0" err="1"/>
               <a:t>sess.run</a:t>
             </a:r>
             <a:r>
-              <a:rPr lang="en-US" sz="1800" dirty="0">
-                <a:solidFill>
-                  <a:schemeClr val="tx1">
-                    <a:lumMod val="50000"/>
-                    <a:lumOff val="50000"/>
-                  </a:schemeClr>
-                </a:solidFill>
-              </a:rPr>
+              <a:rPr lang="en-US" sz="1800" dirty="0"/>
               <a:t>([w, b]) </a:t>
             </a:r>
           </a:p>
@@ -16926,605 +16485,220 @@
               <a:buNone/>
             </a:pPr>
             <a:r>
-              <a:rPr lang="en-US" sz="1800" dirty="0">
-                <a:solidFill>
-                  <a:schemeClr val="tx1">
-                    <a:lumMod val="50000"/>
-                    <a:lumOff val="50000"/>
-                  </a:schemeClr>
-                </a:solidFill>
-              </a:rPr>
+              <a:rPr lang="en-US" sz="1800" dirty="0"/>
               <a:t>import </a:t>
             </a:r>
             <a:r>
-              <a:rPr lang="en-US" sz="1800" dirty="0" err="1">
-                <a:solidFill>
-                  <a:schemeClr val="tx1">
-                    <a:lumMod val="50000"/>
-                    <a:lumOff val="50000"/>
-                  </a:schemeClr>
-                </a:solidFill>
-              </a:rPr>
+              <a:rPr lang="en-US" sz="1800" dirty="0" err="1"/>
               <a:t>tensorflow</a:t>
             </a:r>
             <a:r>
-              <a:rPr lang="en-US" sz="1800" dirty="0">
-                <a:solidFill>
-                  <a:schemeClr val="tx1">
-                    <a:lumMod val="50000"/>
-                    <a:lumOff val="50000"/>
-                  </a:schemeClr>
-                </a:solidFill>
-              </a:rPr>
+              <a:rPr lang="en-US" sz="1800" dirty="0"/>
               <a:t> as </a:t>
             </a:r>
             <a:r>
-              <a:rPr lang="en-US" sz="1800" dirty="0" err="1">
-                <a:solidFill>
-                  <a:schemeClr val="tx1">
-                    <a:lumMod val="50000"/>
-                    <a:lumOff val="50000"/>
-                  </a:schemeClr>
-                </a:solidFill>
-              </a:rPr>
+              <a:rPr lang="en-US" sz="1800" dirty="0" err="1"/>
               <a:t>tf</a:t>
             </a:r>
             <a:r>
-              <a:rPr lang="en-US" sz="1800" dirty="0">
-                <a:solidFill>
-                  <a:schemeClr val="tx1">
-                    <a:lumMod val="50000"/>
-                    <a:lumOff val="50000"/>
-                  </a:schemeClr>
-                </a:solidFill>
-              </a:rPr>
+              <a:rPr lang="en-US" sz="1800" dirty="0"/>
               <a:t/>
             </a:r>
             <a:br>
-              <a:rPr lang="en-US" sz="1800" dirty="0">
-                <a:solidFill>
-                  <a:schemeClr val="tx1">
-                    <a:lumMod val="50000"/>
-                    <a:lumOff val="50000"/>
-                  </a:schemeClr>
-                </a:solidFill>
-              </a:rPr>
+              <a:rPr lang="en-US" sz="1800" dirty="0"/>
             </a:br>
-            <a:endParaRPr lang="en-US" sz="1800" dirty="0">
-              <a:solidFill>
-                <a:schemeClr val="tx1">
-                  <a:lumMod val="50000"/>
-                  <a:lumOff val="50000"/>
-                </a:schemeClr>
-              </a:solidFill>
-            </a:endParaRPr>
+            <a:endParaRPr lang="en-US" sz="1800" dirty="0"/>
           </a:p>
           <a:p>
             <a:pPr marL="0" indent="0">
               <a:buNone/>
             </a:pPr>
             <a:r>
-              <a:rPr lang="en-US" sz="1800" dirty="0">
-                <a:solidFill>
-                  <a:schemeClr val="tx1">
-                    <a:lumMod val="50000"/>
-                    <a:lumOff val="50000"/>
-                  </a:schemeClr>
-                </a:solidFill>
-              </a:rPr>
+              <a:rPr lang="en-US" sz="1800" dirty="0"/>
               <a:t>from </a:t>
             </a:r>
             <a:r>
-              <a:rPr lang="en-US" sz="1800" dirty="0" err="1">
-                <a:solidFill>
-                  <a:schemeClr val="tx1">
-                    <a:lumMod val="50000"/>
-                    <a:lumOff val="50000"/>
-                  </a:schemeClr>
-                </a:solidFill>
-              </a:rPr>
+              <a:rPr lang="en-US" sz="1800" dirty="0" err="1"/>
               <a:t>tensorflow.python.keras.models</a:t>
             </a:r>
             <a:r>
-              <a:rPr lang="en-US" sz="1800" dirty="0">
-                <a:solidFill>
-                  <a:schemeClr val="tx1">
-                    <a:lumMod val="50000"/>
-                    <a:lumOff val="50000"/>
-                  </a:schemeClr>
-                </a:solidFill>
-              </a:rPr>
+              <a:rPr lang="en-US" sz="1800" dirty="0"/>
               <a:t> import Sequential </a:t>
             </a:r>
             <a:br>
-              <a:rPr lang="en-US" sz="1800" dirty="0">
-                <a:solidFill>
-                  <a:schemeClr val="tx1">
-                    <a:lumMod val="50000"/>
-                    <a:lumOff val="50000"/>
-                  </a:schemeClr>
-                </a:solidFill>
-              </a:rPr>
+              <a:rPr lang="en-US" sz="1800" dirty="0"/>
             </a:br>
             <a:r>
-              <a:rPr lang="en-US" sz="1800" dirty="0">
-                <a:solidFill>
-                  <a:schemeClr val="tx1">
-                    <a:lumMod val="50000"/>
-                    <a:lumOff val="50000"/>
-                  </a:schemeClr>
-                </a:solidFill>
-              </a:rPr>
+              <a:rPr lang="en-US" sz="1800" dirty="0"/>
               <a:t>from </a:t>
             </a:r>
             <a:r>
-              <a:rPr lang="en-US" sz="1800" dirty="0" err="1">
-                <a:solidFill>
-                  <a:schemeClr val="tx1">
-                    <a:lumMod val="50000"/>
-                    <a:lumOff val="50000"/>
-                  </a:schemeClr>
-                </a:solidFill>
-              </a:rPr>
+              <a:rPr lang="en-US" sz="1800" dirty="0" err="1"/>
               <a:t>tensorflow.python.keras.layers</a:t>
             </a:r>
             <a:r>
-              <a:rPr lang="en-US" sz="1800" dirty="0">
-                <a:solidFill>
-                  <a:schemeClr val="tx1">
-                    <a:lumMod val="50000"/>
-                    <a:lumOff val="50000"/>
-                  </a:schemeClr>
-                </a:solidFill>
-              </a:rPr>
+              <a:rPr lang="en-US" sz="1800" dirty="0"/>
               <a:t> import Dense, Activation </a:t>
             </a:r>
             <a:br>
-              <a:rPr lang="en-US" sz="1800" dirty="0">
-                <a:solidFill>
-                  <a:schemeClr val="tx1">
-                    <a:lumMod val="50000"/>
-                    <a:lumOff val="50000"/>
-                  </a:schemeClr>
-                </a:solidFill>
-              </a:rPr>
+              <a:rPr lang="en-US" sz="1800" dirty="0"/>
             </a:br>
-            <a:endParaRPr lang="en-US" sz="1800" dirty="0">
-              <a:solidFill>
-                <a:schemeClr val="tx1">
-                  <a:lumMod val="50000"/>
-                  <a:lumOff val="50000"/>
-                </a:schemeClr>
-              </a:solidFill>
-            </a:endParaRPr>
+            <a:endParaRPr lang="en-US" sz="1800" dirty="0"/>
           </a:p>
           <a:p>
             <a:pPr marL="0" indent="0">
               <a:buNone/>
             </a:pPr>
             <a:r>
-              <a:rPr lang="en-US" sz="1800" dirty="0">
-                <a:solidFill>
-                  <a:schemeClr val="tx1">
-                    <a:lumMod val="50000"/>
-                    <a:lumOff val="50000"/>
-                  </a:schemeClr>
-                </a:solidFill>
-              </a:rPr>
+              <a:rPr lang="en-US" sz="1800" dirty="0"/>
               <a:t>model = Sequential() </a:t>
             </a:r>
             <a:br>
-              <a:rPr lang="en-US" sz="1800" dirty="0">
-                <a:solidFill>
-                  <a:schemeClr val="tx1">
-                    <a:lumMod val="50000"/>
-                    <a:lumOff val="50000"/>
-                  </a:schemeClr>
-                </a:solidFill>
-              </a:rPr>
+              <a:rPr lang="en-US" sz="1800" dirty="0"/>
             </a:br>
             <a:r>
-              <a:rPr lang="en-US" sz="1800" dirty="0" err="1">
-                <a:solidFill>
-                  <a:schemeClr val="tx1">
-                    <a:lumMod val="50000"/>
-                    <a:lumOff val="50000"/>
-                  </a:schemeClr>
-                </a:solidFill>
-              </a:rPr>
+              <a:rPr lang="en-US" sz="1800" dirty="0" err="1"/>
               <a:t>model.add</a:t>
             </a:r>
             <a:r>
-              <a:rPr lang="en-US" sz="1800" dirty="0">
-                <a:solidFill>
-                  <a:schemeClr val="tx1">
-                    <a:lumMod val="50000"/>
-                    <a:lumOff val="50000"/>
-                  </a:schemeClr>
-                </a:solidFill>
-              </a:rPr>
+              <a:rPr lang="en-US" sz="1800" dirty="0"/>
               <a:t>(Dense(10, </a:t>
             </a:r>
             <a:r>
-              <a:rPr lang="en-US" sz="1800" dirty="0" err="1">
-                <a:solidFill>
-                  <a:schemeClr val="tx1">
-                    <a:lumMod val="50000"/>
-                    <a:lumOff val="50000"/>
-                  </a:schemeClr>
-                </a:solidFill>
-              </a:rPr>
+              <a:rPr lang="en-US" sz="1800" dirty="0" err="1"/>
               <a:t>input_dim</a:t>
             </a:r>
             <a:r>
-              <a:rPr lang="en-US" sz="1800" dirty="0">
-                <a:solidFill>
-                  <a:schemeClr val="tx1">
-                    <a:lumMod val="50000"/>
-                    <a:lumOff val="50000"/>
-                  </a:schemeClr>
-                </a:solidFill>
-              </a:rPr>
+              <a:rPr lang="en-US" sz="1800" dirty="0"/>
               <a:t>=100, activation='</a:t>
             </a:r>
             <a:r>
-              <a:rPr lang="en-US" sz="1800" dirty="0" err="1">
-                <a:solidFill>
-                  <a:schemeClr val="tx1">
-                    <a:lumMod val="50000"/>
-                    <a:lumOff val="50000"/>
-                  </a:schemeClr>
-                </a:solidFill>
-              </a:rPr>
+              <a:rPr lang="en-US" sz="1800" dirty="0" err="1"/>
               <a:t>softmax</a:t>
             </a:r>
             <a:r>
-              <a:rPr lang="en-US" sz="1800" dirty="0">
-                <a:solidFill>
-                  <a:schemeClr val="tx1">
-                    <a:lumMod val="50000"/>
-                    <a:lumOff val="50000"/>
-                  </a:schemeClr>
-                </a:solidFill>
-              </a:rPr>
+              <a:rPr lang="en-US" sz="1800" dirty="0"/>
               <a:t>')) </a:t>
             </a:r>
             <a:br>
-              <a:rPr lang="en-US" sz="1800" dirty="0">
-                <a:solidFill>
-                  <a:schemeClr val="tx1">
-                    <a:lumMod val="50000"/>
-                    <a:lumOff val="50000"/>
-                  </a:schemeClr>
-                </a:solidFill>
-              </a:rPr>
+              <a:rPr lang="en-US" sz="1800" dirty="0"/>
             </a:br>
             <a:r>
-              <a:rPr lang="en-US" sz="1800" dirty="0" err="1">
-                <a:solidFill>
-                  <a:schemeClr val="tx1">
-                    <a:lumMod val="50000"/>
-                    <a:lumOff val="50000"/>
-                  </a:schemeClr>
-                </a:solidFill>
-              </a:rPr>
+              <a:rPr lang="en-US" sz="1800" dirty="0" err="1"/>
               <a:t>model.compile</a:t>
             </a:r>
             <a:r>
-              <a:rPr lang="en-US" sz="1800" dirty="0">
-                <a:solidFill>
-                  <a:schemeClr val="tx1">
-                    <a:lumMod val="50000"/>
-                    <a:lumOff val="50000"/>
-                  </a:schemeClr>
-                </a:solidFill>
-              </a:rPr>
+              <a:rPr lang="en-US" sz="1800" dirty="0"/>
               <a:t>(optimizer='</a:t>
             </a:r>
             <a:r>
-              <a:rPr lang="en-US" sz="1800" dirty="0" err="1">
-                <a:solidFill>
-                  <a:schemeClr val="tx1">
-                    <a:lumMod val="50000"/>
-                    <a:lumOff val="50000"/>
-                  </a:schemeClr>
-                </a:solidFill>
-              </a:rPr>
+              <a:rPr lang="en-US" sz="1800" dirty="0" err="1"/>
               <a:t>sgd</a:t>
             </a:r>
             <a:r>
-              <a:rPr lang="en-US" sz="1800" dirty="0">
-                <a:solidFill>
-                  <a:schemeClr val="tx1">
-                    <a:lumMod val="50000"/>
-                    <a:lumOff val="50000"/>
-                  </a:schemeClr>
-                </a:solidFill>
-              </a:rPr>
+              <a:rPr lang="en-US" sz="1800" dirty="0"/>
               <a:t>', loss='</a:t>
             </a:r>
             <a:r>
-              <a:rPr lang="en-US" sz="1800" dirty="0" err="1">
-                <a:solidFill>
-                  <a:schemeClr val="tx1">
-                    <a:lumMod val="50000"/>
-                    <a:lumOff val="50000"/>
-                  </a:schemeClr>
-                </a:solidFill>
-              </a:rPr>
+              <a:rPr lang="en-US" sz="1800" dirty="0" err="1"/>
               <a:t>categorical_crossentropy</a:t>
             </a:r>
             <a:r>
-              <a:rPr lang="en-US" sz="1800" dirty="0">
-                <a:solidFill>
-                  <a:schemeClr val="tx1">
-                    <a:lumMod val="50000"/>
-                    <a:lumOff val="50000"/>
-                  </a:schemeClr>
-                </a:solidFill>
-              </a:rPr>
+              <a:rPr lang="en-US" sz="1800" dirty="0"/>
               <a:t>', metrics=['accuracy']) </a:t>
             </a:r>
             <a:br>
-              <a:rPr lang="en-US" sz="1800" dirty="0">
-                <a:solidFill>
-                  <a:schemeClr val="tx1">
-                    <a:lumMod val="50000"/>
-                    <a:lumOff val="50000"/>
-                  </a:schemeClr>
-                </a:solidFill>
-              </a:rPr>
+              <a:rPr lang="en-US" sz="1800" dirty="0"/>
             </a:br>
             <a:r>
-              <a:rPr lang="en-US" sz="1800" dirty="0">
-                <a:solidFill>
-                  <a:schemeClr val="tx1">
-                    <a:lumMod val="50000"/>
-                    <a:lumOff val="50000"/>
-                  </a:schemeClr>
-                </a:solidFill>
-              </a:rPr>
+              <a:rPr lang="en-US" sz="1800" dirty="0"/>
               <a:t>history = </a:t>
             </a:r>
             <a:r>
-              <a:rPr lang="en-US" sz="1800" dirty="0" err="1">
-                <a:solidFill>
-                  <a:schemeClr val="tx1">
-                    <a:lumMod val="50000"/>
-                    <a:lumOff val="50000"/>
-                  </a:schemeClr>
-                </a:solidFill>
-              </a:rPr>
+              <a:rPr lang="en-US" sz="1800" dirty="0" err="1"/>
               <a:t>model.fit</a:t>
             </a:r>
             <a:r>
-              <a:rPr lang="en-US" sz="1800" dirty="0">
-                <a:solidFill>
-                  <a:schemeClr val="tx1">
-                    <a:lumMod val="50000"/>
-                    <a:lumOff val="50000"/>
-                  </a:schemeClr>
-                </a:solidFill>
-              </a:rPr>
+              <a:rPr lang="en-US" sz="1800" dirty="0"/>
               <a:t>(</a:t>
             </a:r>
             <a:r>
-              <a:rPr lang="en-US" sz="1800" dirty="0" err="1">
-                <a:solidFill>
-                  <a:schemeClr val="tx1">
-                    <a:lumMod val="50000"/>
-                    <a:lumOff val="50000"/>
-                  </a:schemeClr>
-                </a:solidFill>
-              </a:rPr>
+              <a:rPr lang="en-US" sz="1800" dirty="0" err="1"/>
               <a:t>X_train</a:t>
             </a:r>
             <a:r>
-              <a:rPr lang="en-US" sz="1800" dirty="0">
-                <a:solidFill>
-                  <a:schemeClr val="tx1">
-                    <a:lumMod val="50000"/>
-                    <a:lumOff val="50000"/>
-                  </a:schemeClr>
-                </a:solidFill>
-              </a:rPr>
+              <a:rPr lang="en-US" sz="1800" dirty="0"/>
               <a:t>, </a:t>
             </a:r>
             <a:r>
-              <a:rPr lang="en-US" sz="1800" dirty="0" err="1">
-                <a:solidFill>
-                  <a:schemeClr val="tx1">
-                    <a:lumMod val="50000"/>
-                    <a:lumOff val="50000"/>
-                  </a:schemeClr>
-                </a:solidFill>
-              </a:rPr>
+              <a:rPr lang="en-US" sz="1800" dirty="0" err="1"/>
               <a:t>Y_train</a:t>
             </a:r>
             <a:r>
-              <a:rPr lang="en-US" sz="1800" dirty="0">
-                <a:solidFill>
-                  <a:schemeClr val="tx1">
-                    <a:lumMod val="50000"/>
-                    <a:lumOff val="50000"/>
-                  </a:schemeClr>
-                </a:solidFill>
-              </a:rPr>
+              <a:rPr lang="en-US" sz="1800" dirty="0"/>
               <a:t>, 128, </a:t>
             </a:r>
             <a:r>
-              <a:rPr lang="en-US" sz="1800" dirty="0" err="1">
-                <a:solidFill>
-                  <a:schemeClr val="tx1">
-                    <a:lumMod val="50000"/>
-                    <a:lumOff val="50000"/>
-                  </a:schemeClr>
-                </a:solidFill>
-              </a:rPr>
+              <a:rPr lang="en-US" sz="1800" dirty="0" err="1"/>
               <a:t>nb_epoch</a:t>
             </a:r>
             <a:r>
-              <a:rPr lang="en-US" sz="1800" dirty="0">
-                <a:solidFill>
-                  <a:schemeClr val="tx1">
-                    <a:lumMod val="50000"/>
-                    <a:lumOff val="50000"/>
-                  </a:schemeClr>
-                </a:solidFill>
-              </a:rPr>
+              <a:rPr lang="en-US" sz="1800" dirty="0"/>
               <a:t>=5,  </a:t>
             </a:r>
             <a:r>
-              <a:rPr lang="en-US" sz="1800" dirty="0" err="1">
-                <a:solidFill>
-                  <a:schemeClr val="tx1">
-                    <a:lumMod val="50000"/>
-                    <a:lumOff val="50000"/>
-                  </a:schemeClr>
-                </a:solidFill>
-              </a:rPr>
+              <a:rPr lang="en-US" sz="1800" dirty="0" err="1"/>
               <a:t>validation_data</a:t>
             </a:r>
             <a:r>
-              <a:rPr lang="en-US" sz="1800" dirty="0">
-                <a:solidFill>
-                  <a:schemeClr val="tx1">
-                    <a:lumMod val="50000"/>
-                    <a:lumOff val="50000"/>
-                  </a:schemeClr>
-                </a:solidFill>
-              </a:rPr>
+              <a:rPr lang="en-US" sz="1800" dirty="0"/>
               <a:t>=(</a:t>
             </a:r>
             <a:r>
-              <a:rPr lang="en-US" sz="1800" dirty="0" err="1">
-                <a:solidFill>
-                  <a:schemeClr val="tx1">
-                    <a:lumMod val="50000"/>
-                    <a:lumOff val="50000"/>
-                  </a:schemeClr>
-                </a:solidFill>
-              </a:rPr>
+              <a:rPr lang="en-US" sz="1800" dirty="0" err="1"/>
               <a:t>X_test</a:t>
             </a:r>
             <a:r>
-              <a:rPr lang="en-US" sz="1800" dirty="0">
-                <a:solidFill>
-                  <a:schemeClr val="tx1">
-                    <a:lumMod val="50000"/>
-                    <a:lumOff val="50000"/>
-                  </a:schemeClr>
-                </a:solidFill>
-              </a:rPr>
+              <a:rPr lang="en-US" sz="1800" dirty="0"/>
               <a:t>, </a:t>
             </a:r>
             <a:r>
-              <a:rPr lang="en-US" sz="1800" dirty="0" err="1">
-                <a:solidFill>
-                  <a:schemeClr val="tx1">
-                    <a:lumMod val="50000"/>
-                    <a:lumOff val="50000"/>
-                  </a:schemeClr>
-                </a:solidFill>
-              </a:rPr>
+              <a:rPr lang="en-US" sz="1800" dirty="0" err="1"/>
               <a:t>Y_test</a:t>
             </a:r>
             <a:r>
-              <a:rPr lang="en-US" sz="1800" dirty="0">
-                <a:solidFill>
-                  <a:schemeClr val="tx1">
-                    <a:lumMod val="50000"/>
-                    <a:lumOff val="50000"/>
-                  </a:schemeClr>
-                </a:solidFill>
-              </a:rPr>
+              <a:rPr lang="en-US" sz="1800" dirty="0"/>
               <a:t>)) </a:t>
             </a:r>
             <a:br>
-              <a:rPr lang="en-US" sz="1800" dirty="0">
-                <a:solidFill>
-                  <a:schemeClr val="tx1">
-                    <a:lumMod val="50000"/>
-                    <a:lumOff val="50000"/>
-                  </a:schemeClr>
-                </a:solidFill>
-              </a:rPr>
+              <a:rPr lang="en-US" sz="1800" dirty="0"/>
             </a:br>
             <a:r>
-              <a:rPr lang="en-US" sz="1800" dirty="0">
-                <a:solidFill>
-                  <a:schemeClr val="tx1">
-                    <a:lumMod val="50000"/>
-                    <a:lumOff val="50000"/>
-                  </a:schemeClr>
-                </a:solidFill>
-              </a:rPr>
+              <a:rPr lang="en-US" sz="1800" dirty="0"/>
               <a:t>score = </a:t>
             </a:r>
             <a:r>
-              <a:rPr lang="en-US" sz="1800" dirty="0" err="1">
-                <a:solidFill>
-                  <a:schemeClr val="tx1">
-                    <a:lumMod val="50000"/>
-                    <a:lumOff val="50000"/>
-                  </a:schemeClr>
-                </a:solidFill>
-              </a:rPr>
+              <a:rPr lang="en-US" sz="1800" dirty="0" err="1"/>
               <a:t>model.evaluate</a:t>
             </a:r>
             <a:r>
-              <a:rPr lang="en-US" sz="1800" dirty="0">
-                <a:solidFill>
-                  <a:schemeClr val="tx1">
-                    <a:lumMod val="50000"/>
-                    <a:lumOff val="50000"/>
-                  </a:schemeClr>
-                </a:solidFill>
-              </a:rPr>
+              <a:rPr lang="en-US" sz="1800" dirty="0"/>
               <a:t>(</a:t>
             </a:r>
             <a:r>
-              <a:rPr lang="en-US" sz="1800" dirty="0" err="1">
-                <a:solidFill>
-                  <a:schemeClr val="tx1">
-                    <a:lumMod val="50000"/>
-                    <a:lumOff val="50000"/>
-                  </a:schemeClr>
-                </a:solidFill>
-              </a:rPr>
+              <a:rPr lang="en-US" sz="1800" dirty="0" err="1"/>
               <a:t>X_test</a:t>
             </a:r>
             <a:r>
-              <a:rPr lang="en-US" sz="1800" dirty="0">
-                <a:solidFill>
-                  <a:schemeClr val="tx1">
-                    <a:lumMod val="50000"/>
-                    <a:lumOff val="50000"/>
-                  </a:schemeClr>
-                </a:solidFill>
-              </a:rPr>
+              <a:rPr lang="en-US" sz="1800" dirty="0"/>
               <a:t>, </a:t>
             </a:r>
             <a:r>
-              <a:rPr lang="en-US" sz="1800" dirty="0" err="1" smtClean="0">
-                <a:solidFill>
-                  <a:schemeClr val="tx1">
-                    <a:lumMod val="50000"/>
-                    <a:lumOff val="50000"/>
-                  </a:schemeClr>
-                </a:solidFill>
-              </a:rPr>
+              <a:rPr lang="en-US" sz="1800" dirty="0" err="1" smtClean="0"/>
               <a:t>Y_test</a:t>
             </a:r>
             <a:r>
-              <a:rPr lang="en-US" sz="1800" dirty="0" smtClean="0">
-                <a:solidFill>
-                  <a:schemeClr val="tx1">
-                    <a:lumMod val="50000"/>
-                    <a:lumOff val="50000"/>
-                  </a:schemeClr>
-                </a:solidFill>
-              </a:rPr>
+              <a:rPr lang="en-US" sz="1800" dirty="0" smtClean="0"/>
               <a:t>) </a:t>
             </a:r>
             <a:r>
@@ -19573,24 +18747,84 @@
           <a:p>
             <a:r>
               <a:rPr lang="en-US" dirty="0"/>
-              <a:t>For Columbia graduates, demonstrate “what can we do with deep neural networks”</a:t>
+              <a:t>For Columbia graduates, </a:t>
+            </a:r>
+            <a:r>
+              <a:rPr lang="en-US" dirty="0" smtClean="0"/>
+              <a:t>teach “what </a:t>
+            </a:r>
+            <a:r>
+              <a:rPr lang="en-US" dirty="0"/>
+              <a:t>can we do with deep neural networks</a:t>
+            </a:r>
+            <a:r>
+              <a:rPr lang="en-US" dirty="0" smtClean="0"/>
+              <a:t>”</a:t>
             </a:r>
             <a:endParaRPr lang="en-US" dirty="0" smtClean="0"/>
           </a:p>
           <a:p>
+            <a:r>
+              <a:rPr lang="en-US" dirty="0" smtClean="0"/>
+              <a:t>Why multi-modalities? </a:t>
+            </a:r>
+          </a:p>
+          <a:p>
+            <a:pPr lvl="1"/>
+            <a:r>
+              <a:rPr lang="en-US" dirty="0" smtClean="0"/>
+              <a:t>Speech, Vision, and NLP are most popular fields for deep learning</a:t>
+            </a:r>
+          </a:p>
+          <a:p>
+            <a:pPr lvl="1"/>
+            <a:r>
+              <a:rPr lang="en-US" dirty="0" smtClean="0"/>
+              <a:t>By comparing three fields, you </a:t>
+            </a:r>
+            <a:r>
+              <a:rPr lang="en-US" dirty="0"/>
+              <a:t>may feel </a:t>
+            </a:r>
+            <a:r>
+              <a:rPr lang="en-US" dirty="0" smtClean="0"/>
+              <a:t>deep networks are no </a:t>
+            </a:r>
+            <a:r>
+              <a:rPr lang="en-US" dirty="0"/>
+              <a:t>longer “black-box magic” </a:t>
+            </a:r>
             <a:endParaRPr lang="en-US" dirty="0" smtClean="0"/>
           </a:p>
           <a:p>
+            <a:pPr lvl="1"/>
             <a:r>
               <a:rPr lang="en-US" dirty="0" smtClean="0"/>
-              <a:t>For Columbia graduates, demonstrate “what can we do with deep neural networks”</a:t>
-            </a:r>
-            <a:endParaRPr lang="en-US" sz="2000" dirty="0" smtClean="0"/>
-          </a:p>
-          <a:p>
-            <a:endParaRPr lang="en-US" dirty="0"/>
-          </a:p>
-          <a:p>
+              <a:t>We </a:t>
+            </a:r>
+            <a:r>
+              <a:rPr lang="en-US" dirty="0"/>
+              <a:t>hope you can </a:t>
+            </a:r>
+            <a:r>
+              <a:rPr lang="en-US" dirty="0" smtClean="0"/>
+              <a:t>generalize these success to multi-modal problem or a new domain</a:t>
+            </a:r>
+            <a:endParaRPr lang="en-US" dirty="0" smtClean="0"/>
+          </a:p>
+          <a:p>
+            <a:r>
+              <a:rPr lang="en-US" dirty="0" smtClean="0"/>
+              <a:t>How?</a:t>
+            </a:r>
+            <a:endParaRPr lang="en-US" sz="1600" dirty="0"/>
+          </a:p>
+          <a:p>
+            <a:pPr lvl="1"/>
+            <a:r>
+              <a:rPr lang="en-US" dirty="0" smtClean="0"/>
+              <a:t>Course, Homework and Projects</a:t>
+            </a:r>
             <a:endParaRPr lang="en-US" dirty="0" smtClean="0"/>
           </a:p>
           <a:p>

</xml_diff>

<commit_message>
update code high light color; change code question's option
</commit_message>
<xml_diff>
--- a/lecture/lecture1_llcao.pptx
+++ b/lecture/lecture1_llcao.pptx
@@ -11171,7 +11171,15 @@
           <a:p>
             <a:r>
               <a:rPr lang="en-US" dirty="0" smtClean="0"/>
-              <a:t>A python framework of computing math expression</a:t>
+              <a:t>A </a:t>
+            </a:r>
+            <a:r>
+              <a:rPr lang="en-US" dirty="0" smtClean="0"/>
+              <a:t>python/C </a:t>
+            </a:r>
+            <a:r>
+              <a:rPr lang="en-US" dirty="0" smtClean="0"/>
+              <a:t>framework of computing math expression</a:t>
             </a:r>
           </a:p>
           <a:p>
@@ -11318,7 +11326,15 @@
           <a:p>
             <a:r>
               <a:rPr lang="en-US" dirty="0" smtClean="0"/>
-              <a:t>A python framework of computing math expression</a:t>
+              <a:t>A </a:t>
+            </a:r>
+            <a:r>
+              <a:rPr lang="en-US" dirty="0" smtClean="0"/>
+              <a:t>python/C </a:t>
+            </a:r>
+            <a:r>
+              <a:rPr lang="en-US" dirty="0" smtClean="0"/>
+              <a:t>framework of computing math expression</a:t>
             </a:r>
           </a:p>
           <a:p>
@@ -12173,154 +12189,56 @@
               <a:buNone/>
             </a:pPr>
             <a:r>
-              <a:rPr lang="en-US" dirty="0">
-                <a:solidFill>
-                  <a:schemeClr val="tx1">
-                    <a:lumMod val="50000"/>
-                    <a:lumOff val="50000"/>
-                  </a:schemeClr>
-                </a:solidFill>
-              </a:rPr>
+              <a:rPr lang="en-US" dirty="0"/>
               <a:t>import </a:t>
             </a:r>
             <a:r>
-              <a:rPr lang="en-US" dirty="0" err="1">
-                <a:solidFill>
-                  <a:schemeClr val="tx1">
-                    <a:lumMod val="50000"/>
-                    <a:lumOff val="50000"/>
-                  </a:schemeClr>
-                </a:solidFill>
-              </a:rPr>
+              <a:rPr lang="en-US" dirty="0" err="1"/>
               <a:t>tensorflow</a:t>
             </a:r>
             <a:r>
-              <a:rPr lang="en-US" dirty="0">
-                <a:solidFill>
-                  <a:schemeClr val="tx1">
-                    <a:lumMod val="50000"/>
-                    <a:lumOff val="50000"/>
-                  </a:schemeClr>
-                </a:solidFill>
-              </a:rPr>
+              <a:rPr lang="en-US" dirty="0"/>
               <a:t> as </a:t>
             </a:r>
             <a:r>
-              <a:rPr lang="en-US" dirty="0" err="1">
-                <a:solidFill>
-                  <a:schemeClr val="tx1">
-                    <a:lumMod val="50000"/>
-                    <a:lumOff val="50000"/>
-                  </a:schemeClr>
-                </a:solidFill>
-              </a:rPr>
+              <a:rPr lang="en-US" dirty="0" err="1"/>
               <a:t>tf</a:t>
             </a:r>
             <a:r>
-              <a:rPr lang="en-US" dirty="0">
-                <a:solidFill>
-                  <a:schemeClr val="tx1">
-                    <a:lumMod val="50000"/>
-                    <a:lumOff val="50000"/>
-                  </a:schemeClr>
-                </a:solidFill>
-              </a:rPr>
+              <a:rPr lang="en-US" dirty="0"/>
               <a:t/>
             </a:r>
             <a:br>
-              <a:rPr lang="en-US" dirty="0">
-                <a:solidFill>
-                  <a:schemeClr val="tx1">
-                    <a:lumMod val="50000"/>
-                    <a:lumOff val="50000"/>
-                  </a:schemeClr>
-                </a:solidFill>
-              </a:rPr>
+              <a:rPr lang="en-US" dirty="0"/>
             </a:br>
             <a:r>
-              <a:rPr lang="en-US" dirty="0">
-                <a:solidFill>
-                  <a:schemeClr val="tx1">
-                    <a:lumMod val="50000"/>
-                    <a:lumOff val="50000"/>
-                  </a:schemeClr>
-                </a:solidFill>
-              </a:rPr>
+              <a:rPr lang="en-US" dirty="0"/>
               <a:t>a = </a:t>
             </a:r>
             <a:r>
-              <a:rPr lang="en-US" dirty="0" err="1">
-                <a:solidFill>
-                  <a:schemeClr val="tx1">
-                    <a:lumMod val="50000"/>
-                    <a:lumOff val="50000"/>
-                  </a:schemeClr>
-                </a:solidFill>
-              </a:rPr>
+              <a:rPr lang="en-US" dirty="0" err="1"/>
               <a:t>tf.add</a:t>
             </a:r>
             <a:r>
-              <a:rPr lang="en-US" dirty="0" smtClean="0">
-                <a:solidFill>
-                  <a:schemeClr val="tx1">
-                    <a:lumMod val="50000"/>
-                    <a:lumOff val="50000"/>
-                  </a:schemeClr>
-                </a:solidFill>
-              </a:rPr>
+              <a:rPr lang="en-US" dirty="0" smtClean="0"/>
               <a:t>([2,1], [1,2])</a:t>
             </a:r>
             <a:r>
-              <a:rPr lang="en-US" dirty="0">
-                <a:solidFill>
-                  <a:schemeClr val="tx1">
-                    <a:lumMod val="50000"/>
-                    <a:lumOff val="50000"/>
-                  </a:schemeClr>
-                </a:solidFill>
-              </a:rPr>
+              <a:rPr lang="en-US" dirty="0"/>
               <a:t/>
             </a:r>
             <a:br>
-              <a:rPr lang="en-US" dirty="0">
-                <a:solidFill>
-                  <a:schemeClr val="tx1">
-                    <a:lumMod val="50000"/>
-                    <a:lumOff val="50000"/>
-                  </a:schemeClr>
-                </a:solidFill>
-              </a:rPr>
+              <a:rPr lang="en-US" dirty="0"/>
             </a:br>
             <a:r>
-              <a:rPr lang="en-US" dirty="0">
-                <a:solidFill>
-                  <a:schemeClr val="tx1">
-                    <a:lumMod val="50000"/>
-                    <a:lumOff val="50000"/>
-                  </a:schemeClr>
-                </a:solidFill>
-              </a:rPr>
+              <a:rPr lang="en-US" dirty="0"/>
               <a:t>print(a</a:t>
             </a:r>
             <a:r>
-              <a:rPr lang="en-US" dirty="0" smtClean="0">
-                <a:solidFill>
-                  <a:schemeClr val="tx1">
-                    <a:lumMod val="50000"/>
-                    <a:lumOff val="50000"/>
-                  </a:schemeClr>
-                </a:solidFill>
-              </a:rPr>
+              <a:rPr lang="en-US" dirty="0" smtClean="0"/>
               <a:t>)</a:t>
             </a:r>
-            <a:endParaRPr lang="en-US" dirty="0">
-              <a:solidFill>
-                <a:schemeClr val="tx1">
-                  <a:lumMod val="50000"/>
-                  <a:lumOff val="50000"/>
-                </a:schemeClr>
-              </a:solidFill>
-            </a:endParaRPr>
+            <a:endParaRPr lang="en-US" dirty="0"/>
           </a:p>
         </p:txBody>
       </p:sp>
@@ -12666,154 +12584,56 @@
               <a:buNone/>
             </a:pPr>
             <a:r>
-              <a:rPr lang="en-US" dirty="0">
-                <a:solidFill>
-                  <a:schemeClr val="tx1">
-                    <a:lumMod val="50000"/>
-                    <a:lumOff val="50000"/>
-                  </a:schemeClr>
-                </a:solidFill>
-              </a:rPr>
+              <a:rPr lang="en-US" dirty="0"/>
               <a:t>import </a:t>
             </a:r>
             <a:r>
-              <a:rPr lang="en-US" dirty="0" err="1">
-                <a:solidFill>
-                  <a:schemeClr val="tx1">
-                    <a:lumMod val="50000"/>
-                    <a:lumOff val="50000"/>
-                  </a:schemeClr>
-                </a:solidFill>
-              </a:rPr>
+              <a:rPr lang="en-US" dirty="0" err="1"/>
               <a:t>tensorflow</a:t>
             </a:r>
             <a:r>
-              <a:rPr lang="en-US" dirty="0">
-                <a:solidFill>
-                  <a:schemeClr val="tx1">
-                    <a:lumMod val="50000"/>
-                    <a:lumOff val="50000"/>
-                  </a:schemeClr>
-                </a:solidFill>
-              </a:rPr>
+              <a:rPr lang="en-US" dirty="0"/>
               <a:t> as </a:t>
             </a:r>
             <a:r>
-              <a:rPr lang="en-US" dirty="0" err="1">
-                <a:solidFill>
-                  <a:schemeClr val="tx1">
-                    <a:lumMod val="50000"/>
-                    <a:lumOff val="50000"/>
-                  </a:schemeClr>
-                </a:solidFill>
-              </a:rPr>
+              <a:rPr lang="en-US" dirty="0" err="1"/>
               <a:t>tf</a:t>
             </a:r>
             <a:r>
-              <a:rPr lang="en-US" dirty="0">
-                <a:solidFill>
-                  <a:schemeClr val="tx1">
-                    <a:lumMod val="50000"/>
-                    <a:lumOff val="50000"/>
-                  </a:schemeClr>
-                </a:solidFill>
-              </a:rPr>
+              <a:rPr lang="en-US" dirty="0"/>
               <a:t/>
             </a:r>
             <a:br>
-              <a:rPr lang="en-US" dirty="0">
-                <a:solidFill>
-                  <a:schemeClr val="tx1">
-                    <a:lumMod val="50000"/>
-                    <a:lumOff val="50000"/>
-                  </a:schemeClr>
-                </a:solidFill>
-              </a:rPr>
+              <a:rPr lang="en-US" dirty="0"/>
             </a:br>
             <a:r>
-              <a:rPr lang="en-US" dirty="0">
-                <a:solidFill>
-                  <a:schemeClr val="tx1">
-                    <a:lumMod val="50000"/>
-                    <a:lumOff val="50000"/>
-                  </a:schemeClr>
-                </a:solidFill>
-              </a:rPr>
+              <a:rPr lang="en-US" dirty="0"/>
               <a:t>a = </a:t>
             </a:r>
             <a:r>
-              <a:rPr lang="en-US" dirty="0" err="1">
-                <a:solidFill>
-                  <a:schemeClr val="tx1">
-                    <a:lumMod val="50000"/>
-                    <a:lumOff val="50000"/>
-                  </a:schemeClr>
-                </a:solidFill>
-              </a:rPr>
+              <a:rPr lang="en-US" dirty="0" err="1"/>
               <a:t>tf.add</a:t>
             </a:r>
             <a:r>
-              <a:rPr lang="en-US" dirty="0" smtClean="0">
-                <a:solidFill>
-                  <a:schemeClr val="tx1">
-                    <a:lumMod val="50000"/>
-                    <a:lumOff val="50000"/>
-                  </a:schemeClr>
-                </a:solidFill>
-              </a:rPr>
+              <a:rPr lang="en-US" dirty="0" smtClean="0"/>
               <a:t>([1,2], [2,1])</a:t>
             </a:r>
             <a:r>
-              <a:rPr lang="en-US" dirty="0">
-                <a:solidFill>
-                  <a:schemeClr val="tx1">
-                    <a:lumMod val="50000"/>
-                    <a:lumOff val="50000"/>
-                  </a:schemeClr>
-                </a:solidFill>
-              </a:rPr>
+              <a:rPr lang="en-US" dirty="0"/>
               <a:t/>
             </a:r>
             <a:br>
-              <a:rPr lang="en-US" dirty="0">
-                <a:solidFill>
-                  <a:schemeClr val="tx1">
-                    <a:lumMod val="50000"/>
-                    <a:lumOff val="50000"/>
-                  </a:schemeClr>
-                </a:solidFill>
-              </a:rPr>
+              <a:rPr lang="en-US" dirty="0"/>
             </a:br>
             <a:r>
-              <a:rPr lang="en-US" dirty="0">
-                <a:solidFill>
-                  <a:schemeClr val="tx1">
-                    <a:lumMod val="50000"/>
-                    <a:lumOff val="50000"/>
-                  </a:schemeClr>
-                </a:solidFill>
-              </a:rPr>
+              <a:rPr lang="en-US" dirty="0"/>
               <a:t>print(a</a:t>
             </a:r>
             <a:r>
-              <a:rPr lang="en-US" dirty="0" smtClean="0">
-                <a:solidFill>
-                  <a:schemeClr val="tx1">
-                    <a:lumMod val="50000"/>
-                    <a:lumOff val="50000"/>
-                  </a:schemeClr>
-                </a:solidFill>
-              </a:rPr>
+              <a:rPr lang="en-US" dirty="0" smtClean="0"/>
               <a:t>)</a:t>
             </a:r>
-            <a:endParaRPr lang="en-US" dirty="0">
-              <a:solidFill>
-                <a:schemeClr val="tx1">
-                  <a:lumMod val="50000"/>
-                  <a:lumOff val="50000"/>
-                </a:schemeClr>
-              </a:solidFill>
-            </a:endParaRPr>
+            <a:endParaRPr lang="en-US" dirty="0"/>
           </a:p>
         </p:txBody>
       </p:sp>
@@ -13324,10 +13144,10 @@
               <a:buAutoNum type="alphaLcParenR"/>
             </a:pPr>
             <a:r>
-              <a:rPr lang="en-US" i="0" dirty="0" smtClean="0"/>
+              <a:rPr lang="en-US" b="1" i="0" dirty="0" smtClean="0"/>
               <a:t>None of above</a:t>
             </a:r>
-            <a:endParaRPr lang="en-US" i="0" dirty="0"/>
+            <a:endParaRPr lang="en-US" b="1" i="0" dirty="0"/>
           </a:p>
         </p:txBody>
       </p:sp>
@@ -13426,154 +13246,56 @@
               <a:buNone/>
             </a:pPr>
             <a:r>
-              <a:rPr lang="en-US" dirty="0">
-                <a:solidFill>
-                  <a:schemeClr val="tx1">
-                    <a:lumMod val="50000"/>
-                    <a:lumOff val="50000"/>
-                  </a:schemeClr>
-                </a:solidFill>
-              </a:rPr>
+              <a:rPr lang="en-US" dirty="0"/>
               <a:t>import </a:t>
             </a:r>
             <a:r>
-              <a:rPr lang="en-US" dirty="0" err="1">
-                <a:solidFill>
-                  <a:schemeClr val="tx1">
-                    <a:lumMod val="50000"/>
-                    <a:lumOff val="50000"/>
-                  </a:schemeClr>
-                </a:solidFill>
-              </a:rPr>
+              <a:rPr lang="en-US" dirty="0" err="1"/>
               <a:t>tensorflow</a:t>
             </a:r>
             <a:r>
-              <a:rPr lang="en-US" dirty="0">
-                <a:solidFill>
-                  <a:schemeClr val="tx1">
-                    <a:lumMod val="50000"/>
-                    <a:lumOff val="50000"/>
-                  </a:schemeClr>
-                </a:solidFill>
-              </a:rPr>
+              <a:rPr lang="en-US" dirty="0"/>
               <a:t> as </a:t>
             </a:r>
             <a:r>
-              <a:rPr lang="en-US" dirty="0" err="1">
-                <a:solidFill>
-                  <a:schemeClr val="tx1">
-                    <a:lumMod val="50000"/>
-                    <a:lumOff val="50000"/>
-                  </a:schemeClr>
-                </a:solidFill>
-              </a:rPr>
+              <a:rPr lang="en-US" dirty="0" err="1"/>
               <a:t>tf</a:t>
             </a:r>
             <a:r>
-              <a:rPr lang="en-US" dirty="0">
-                <a:solidFill>
-                  <a:schemeClr val="tx1">
-                    <a:lumMod val="50000"/>
-                    <a:lumOff val="50000"/>
-                  </a:schemeClr>
-                </a:solidFill>
-              </a:rPr>
+              <a:rPr lang="en-US" dirty="0"/>
               <a:t/>
             </a:r>
             <a:br>
-              <a:rPr lang="en-US" dirty="0">
-                <a:solidFill>
-                  <a:schemeClr val="tx1">
-                    <a:lumMod val="50000"/>
-                    <a:lumOff val="50000"/>
-                  </a:schemeClr>
-                </a:solidFill>
-              </a:rPr>
+              <a:rPr lang="en-US" dirty="0"/>
             </a:br>
             <a:r>
-              <a:rPr lang="en-US" dirty="0">
-                <a:solidFill>
-                  <a:schemeClr val="tx1">
-                    <a:lumMod val="50000"/>
-                    <a:lumOff val="50000"/>
-                  </a:schemeClr>
-                </a:solidFill>
-              </a:rPr>
+              <a:rPr lang="en-US" dirty="0"/>
               <a:t>a = </a:t>
             </a:r>
             <a:r>
-              <a:rPr lang="en-US" dirty="0" err="1">
-                <a:solidFill>
-                  <a:schemeClr val="tx1">
-                    <a:lumMod val="50000"/>
-                    <a:lumOff val="50000"/>
-                  </a:schemeClr>
-                </a:solidFill>
-              </a:rPr>
+              <a:rPr lang="en-US" dirty="0" err="1"/>
               <a:t>tf.add</a:t>
             </a:r>
             <a:r>
-              <a:rPr lang="en-US" dirty="0" smtClean="0">
-                <a:solidFill>
-                  <a:schemeClr val="tx1">
-                    <a:lumMod val="50000"/>
-                    <a:lumOff val="50000"/>
-                  </a:schemeClr>
-                </a:solidFill>
-              </a:rPr>
+              <a:rPr lang="en-US" dirty="0" smtClean="0"/>
               <a:t>([1,2], [2,1])</a:t>
             </a:r>
             <a:r>
-              <a:rPr lang="en-US" dirty="0">
-                <a:solidFill>
-                  <a:schemeClr val="tx1">
-                    <a:lumMod val="50000"/>
-                    <a:lumOff val="50000"/>
-                  </a:schemeClr>
-                </a:solidFill>
-              </a:rPr>
+              <a:rPr lang="en-US" dirty="0"/>
               <a:t/>
             </a:r>
             <a:br>
-              <a:rPr lang="en-US" dirty="0">
-                <a:solidFill>
-                  <a:schemeClr val="tx1">
-                    <a:lumMod val="50000"/>
-                    <a:lumOff val="50000"/>
-                  </a:schemeClr>
-                </a:solidFill>
-              </a:rPr>
+              <a:rPr lang="en-US" dirty="0"/>
             </a:br>
             <a:r>
-              <a:rPr lang="en-US" dirty="0">
-                <a:solidFill>
-                  <a:schemeClr val="tx1">
-                    <a:lumMod val="50000"/>
-                    <a:lumOff val="50000"/>
-                  </a:schemeClr>
-                </a:solidFill>
-              </a:rPr>
+              <a:rPr lang="en-US" dirty="0"/>
               <a:t>print(a</a:t>
             </a:r>
             <a:r>
-              <a:rPr lang="en-US" dirty="0" smtClean="0">
-                <a:solidFill>
-                  <a:schemeClr val="tx1">
-                    <a:lumMod val="50000"/>
-                    <a:lumOff val="50000"/>
-                  </a:schemeClr>
-                </a:solidFill>
-              </a:rPr>
+              <a:rPr lang="en-US" dirty="0" smtClean="0"/>
               <a:t>)</a:t>
             </a:r>
-            <a:endParaRPr lang="en-US" dirty="0">
-              <a:solidFill>
-                <a:schemeClr val="tx1">
-                  <a:lumMod val="50000"/>
-                  <a:lumOff val="50000"/>
-                </a:schemeClr>
-              </a:solidFill>
-            </a:endParaRPr>
+            <a:endParaRPr lang="en-US" dirty="0"/>
           </a:p>
         </p:txBody>
       </p:sp>
@@ -14133,144 +13855,53 @@
               <a:buNone/>
             </a:pPr>
             <a:r>
-              <a:rPr lang="en-US" dirty="0">
-                <a:solidFill>
-                  <a:schemeClr val="tx1">
-                    <a:lumMod val="50000"/>
-                    <a:lumOff val="50000"/>
-                  </a:schemeClr>
-                </a:solidFill>
-              </a:rPr>
+              <a:rPr lang="en-US" dirty="0"/>
               <a:t>import </a:t>
             </a:r>
             <a:r>
-              <a:rPr lang="en-US" dirty="0" err="1">
-                <a:solidFill>
-                  <a:schemeClr val="tx1">
-                    <a:lumMod val="50000"/>
-                    <a:lumOff val="50000"/>
-                  </a:schemeClr>
-                </a:solidFill>
-              </a:rPr>
+              <a:rPr lang="en-US" dirty="0" err="1"/>
               <a:t>tensorflow</a:t>
             </a:r>
             <a:r>
-              <a:rPr lang="en-US" dirty="0">
-                <a:solidFill>
-                  <a:schemeClr val="tx1">
-                    <a:lumMod val="50000"/>
-                    <a:lumOff val="50000"/>
-                  </a:schemeClr>
-                </a:solidFill>
-              </a:rPr>
+              <a:rPr lang="en-US" dirty="0"/>
               <a:t> as </a:t>
             </a:r>
             <a:r>
-              <a:rPr lang="en-US" dirty="0" err="1">
-                <a:solidFill>
-                  <a:schemeClr val="tx1">
-                    <a:lumMod val="50000"/>
-                    <a:lumOff val="50000"/>
-                  </a:schemeClr>
-                </a:solidFill>
-              </a:rPr>
+              <a:rPr lang="en-US" dirty="0" err="1"/>
               <a:t>tf</a:t>
             </a:r>
             <a:r>
-              <a:rPr lang="en-US" dirty="0">
-                <a:solidFill>
-                  <a:schemeClr val="tx1">
-                    <a:lumMod val="50000"/>
-                    <a:lumOff val="50000"/>
-                  </a:schemeClr>
-                </a:solidFill>
-              </a:rPr>
+              <a:rPr lang="en-US" dirty="0"/>
               <a:t/>
             </a:r>
             <a:br>
-              <a:rPr lang="en-US" dirty="0">
-                <a:solidFill>
-                  <a:schemeClr val="tx1">
-                    <a:lumMod val="50000"/>
-                    <a:lumOff val="50000"/>
-                  </a:schemeClr>
-                </a:solidFill>
-              </a:rPr>
+              <a:rPr lang="en-US" dirty="0"/>
             </a:br>
             <a:r>
-              <a:rPr lang="en-US" dirty="0">
-                <a:solidFill>
-                  <a:schemeClr val="tx1">
-                    <a:lumMod val="50000"/>
-                    <a:lumOff val="50000"/>
-                  </a:schemeClr>
-                </a:solidFill>
-              </a:rPr>
+              <a:rPr lang="en-US" dirty="0"/>
               <a:t>a = </a:t>
             </a:r>
             <a:r>
-              <a:rPr lang="en-US" dirty="0" err="1">
-                <a:solidFill>
-                  <a:schemeClr val="tx1">
-                    <a:lumMod val="50000"/>
-                    <a:lumOff val="50000"/>
-                  </a:schemeClr>
-                </a:solidFill>
-              </a:rPr>
+              <a:rPr lang="en-US" dirty="0" err="1"/>
               <a:t>tf.add</a:t>
             </a:r>
             <a:r>
-              <a:rPr lang="en-US" dirty="0" smtClean="0">
-                <a:solidFill>
-                  <a:schemeClr val="tx1">
-                    <a:lumMod val="50000"/>
-                    <a:lumOff val="50000"/>
-                  </a:schemeClr>
-                </a:solidFill>
-              </a:rPr>
+              <a:rPr lang="en-US" dirty="0" smtClean="0"/>
               <a:t>([1,2], [2,1])</a:t>
             </a:r>
             <a:r>
-              <a:rPr lang="en-US" dirty="0">
-                <a:solidFill>
-                  <a:schemeClr val="tx1">
-                    <a:lumMod val="50000"/>
-                    <a:lumOff val="50000"/>
-                  </a:schemeClr>
-                </a:solidFill>
-              </a:rPr>
+              <a:rPr lang="en-US" dirty="0"/>
               <a:t/>
             </a:r>
             <a:br>
-              <a:rPr lang="en-US" dirty="0">
-                <a:solidFill>
-                  <a:schemeClr val="tx1">
-                    <a:lumMod val="50000"/>
-                    <a:lumOff val="50000"/>
-                  </a:schemeClr>
-                </a:solidFill>
-              </a:rPr>
+              <a:rPr lang="en-US" dirty="0"/>
             </a:br>
             <a:r>
-              <a:rPr lang="en-US" dirty="0">
-                <a:solidFill>
-                  <a:schemeClr val="tx1">
-                    <a:lumMod val="50000"/>
-                    <a:lumOff val="50000"/>
-                  </a:schemeClr>
-                </a:solidFill>
-              </a:rPr>
+              <a:rPr lang="en-US" dirty="0"/>
               <a:t>print(a</a:t>
             </a:r>
             <a:r>
-              <a:rPr lang="en-US" dirty="0" smtClean="0">
-                <a:solidFill>
-                  <a:schemeClr val="tx1">
-                    <a:lumMod val="50000"/>
-                    <a:lumOff val="50000"/>
-                  </a:schemeClr>
-                </a:solidFill>
-              </a:rPr>
+              <a:rPr lang="en-US" dirty="0" smtClean="0"/>
               <a:t>)</a:t>
             </a:r>
           </a:p>
@@ -14279,58 +13910,23 @@
               <a:buNone/>
             </a:pPr>
             <a:r>
-              <a:rPr lang="en-US" dirty="0" smtClean="0">
-                <a:solidFill>
-                  <a:schemeClr val="tx1">
-                    <a:lumMod val="50000"/>
-                    <a:lumOff val="50000"/>
-                  </a:schemeClr>
-                </a:solidFill>
-              </a:rPr>
+              <a:rPr lang="en-US" dirty="0" smtClean="0"/>
               <a:t>with </a:t>
             </a:r>
             <a:r>
-              <a:rPr lang="en-US" dirty="0" err="1" smtClean="0">
-                <a:solidFill>
-                  <a:schemeClr val="tx1">
-                    <a:lumMod val="50000"/>
-                    <a:lumOff val="50000"/>
-                  </a:schemeClr>
-                </a:solidFill>
-              </a:rPr>
+              <a:rPr lang="en-US" dirty="0" err="1" smtClean="0"/>
               <a:t>tf.Session</a:t>
             </a:r>
             <a:r>
-              <a:rPr lang="en-US" dirty="0" smtClean="0">
-                <a:solidFill>
-                  <a:schemeClr val="tx1">
-                    <a:lumMod val="50000"/>
-                    <a:lumOff val="50000"/>
-                  </a:schemeClr>
-                </a:solidFill>
-              </a:rPr>
+              <a:rPr lang="en-US" dirty="0" smtClean="0"/>
               <a:t>() as </a:t>
             </a:r>
             <a:r>
-              <a:rPr lang="en-US" dirty="0" err="1" smtClean="0">
-                <a:solidFill>
-                  <a:schemeClr val="tx1">
-                    <a:lumMod val="50000"/>
-                    <a:lumOff val="50000"/>
-                  </a:schemeClr>
-                </a:solidFill>
-              </a:rPr>
+              <a:rPr lang="en-US" dirty="0" err="1" smtClean="0"/>
               <a:t>sess</a:t>
             </a:r>
             <a:r>
-              <a:rPr lang="en-US" dirty="0" smtClean="0">
-                <a:solidFill>
-                  <a:schemeClr val="tx1">
-                    <a:lumMod val="50000"/>
-                    <a:lumOff val="50000"/>
-                  </a:schemeClr>
-                </a:solidFill>
-              </a:rPr>
+              <a:rPr lang="en-US" dirty="0" smtClean="0"/>
               <a:t>:</a:t>
             </a:r>
           </a:p>
@@ -14339,57 +13935,22 @@
               <a:buNone/>
             </a:pPr>
             <a:r>
-              <a:rPr lang="en-US" dirty="0">
-                <a:solidFill>
-                  <a:schemeClr val="tx1">
-                    <a:lumMod val="50000"/>
-                    <a:lumOff val="50000"/>
-                  </a:schemeClr>
-                </a:solidFill>
-              </a:rPr>
+              <a:rPr lang="en-US" dirty="0"/>
               <a:t> </a:t>
             </a:r>
             <a:r>
-              <a:rPr lang="en-US" dirty="0" smtClean="0">
-                <a:solidFill>
-                  <a:schemeClr val="tx1">
-                    <a:lumMod val="50000"/>
-                    <a:lumOff val="50000"/>
-                  </a:schemeClr>
-                </a:solidFill>
-              </a:rPr>
+              <a:rPr lang="en-US" dirty="0" smtClean="0"/>
               <a:t>      print </a:t>
             </a:r>
             <a:r>
-              <a:rPr lang="en-US" dirty="0" err="1" smtClean="0">
-                <a:solidFill>
-                  <a:schemeClr val="tx1">
-                    <a:lumMod val="50000"/>
-                    <a:lumOff val="50000"/>
-                  </a:schemeClr>
-                </a:solidFill>
-              </a:rPr>
+              <a:rPr lang="en-US" dirty="0" err="1" smtClean="0"/>
               <a:t>sess.run</a:t>
             </a:r>
             <a:r>
-              <a:rPr lang="en-US" dirty="0" smtClean="0">
-                <a:solidFill>
-                  <a:schemeClr val="tx1">
-                    <a:lumMod val="50000"/>
-                    <a:lumOff val="50000"/>
-                  </a:schemeClr>
-                </a:solidFill>
-              </a:rPr>
+              <a:rPr lang="en-US" dirty="0" smtClean="0"/>
               <a:t>(a)</a:t>
             </a:r>
-            <a:endParaRPr lang="en-US" dirty="0">
-              <a:solidFill>
-                <a:schemeClr val="tx1">
-                  <a:lumMod val="50000"/>
-                  <a:lumOff val="50000"/>
-                </a:schemeClr>
-              </a:solidFill>
-            </a:endParaRPr>
+            <a:endParaRPr lang="en-US" dirty="0"/>
           </a:p>
         </p:txBody>
       </p:sp>
@@ -15389,165 +14950,60 @@
               <a:buNone/>
             </a:pPr>
             <a:r>
-              <a:rPr lang="en-US" dirty="0">
-                <a:solidFill>
-                  <a:schemeClr val="tx1">
-                    <a:lumMod val="50000"/>
-                    <a:lumOff val="50000"/>
-                  </a:schemeClr>
-                </a:solidFill>
-              </a:rPr>
+              <a:rPr lang="en-US" dirty="0"/>
               <a:t>import </a:t>
             </a:r>
             <a:r>
-              <a:rPr lang="en-US" dirty="0" err="1">
-                <a:solidFill>
-                  <a:schemeClr val="tx1">
-                    <a:lumMod val="50000"/>
-                    <a:lumOff val="50000"/>
-                  </a:schemeClr>
-                </a:solidFill>
-              </a:rPr>
+              <a:rPr lang="en-US" dirty="0" err="1"/>
               <a:t>tensorflow</a:t>
             </a:r>
             <a:r>
-              <a:rPr lang="en-US" dirty="0">
-                <a:solidFill>
-                  <a:schemeClr val="tx1">
-                    <a:lumMod val="50000"/>
-                    <a:lumOff val="50000"/>
-                  </a:schemeClr>
-                </a:solidFill>
-              </a:rPr>
+              <a:rPr lang="en-US" dirty="0"/>
               <a:t> as </a:t>
             </a:r>
             <a:r>
-              <a:rPr lang="en-US" dirty="0" err="1">
-                <a:solidFill>
-                  <a:schemeClr val="tx1">
-                    <a:lumMod val="50000"/>
-                    <a:lumOff val="50000"/>
-                  </a:schemeClr>
-                </a:solidFill>
-              </a:rPr>
+              <a:rPr lang="en-US" dirty="0" err="1"/>
               <a:t>tf</a:t>
             </a:r>
             <a:r>
-              <a:rPr lang="en-US" dirty="0">
-                <a:solidFill>
-                  <a:schemeClr val="tx1">
-                    <a:lumMod val="50000"/>
-                    <a:lumOff val="50000"/>
-                  </a:schemeClr>
-                </a:solidFill>
-              </a:rPr>
+              <a:rPr lang="en-US" dirty="0"/>
               <a:t/>
             </a:r>
             <a:br>
-              <a:rPr lang="en-US" dirty="0">
-                <a:solidFill>
-                  <a:schemeClr val="tx1">
-                    <a:lumMod val="50000"/>
-                    <a:lumOff val="50000"/>
-                  </a:schemeClr>
-                </a:solidFill>
-              </a:rPr>
+              <a:rPr lang="en-US" dirty="0"/>
             </a:br>
             <a:r>
-              <a:rPr lang="en-US" dirty="0">
-                <a:solidFill>
-                  <a:schemeClr val="tx1">
-                    <a:lumMod val="50000"/>
-                    <a:lumOff val="50000"/>
-                  </a:schemeClr>
-                </a:solidFill>
-              </a:rPr>
+              <a:rPr lang="en-US" dirty="0"/>
               <a:t>x = </a:t>
             </a:r>
             <a:r>
-              <a:rPr lang="en-US" dirty="0" err="1">
-                <a:solidFill>
-                  <a:schemeClr val="tx1">
-                    <a:lumMod val="50000"/>
-                    <a:lumOff val="50000"/>
-                  </a:schemeClr>
-                </a:solidFill>
-              </a:rPr>
+              <a:rPr lang="en-US" dirty="0" err="1"/>
               <a:t>tf.placeholder</a:t>
             </a:r>
             <a:r>
-              <a:rPr lang="en-US" dirty="0">
-                <a:solidFill>
-                  <a:schemeClr val="tx1">
-                    <a:lumMod val="50000"/>
-                    <a:lumOff val="50000"/>
-                  </a:schemeClr>
-                </a:solidFill>
-              </a:rPr>
+              <a:rPr lang="en-US" dirty="0"/>
               <a:t>(tf.float32)</a:t>
             </a:r>
             <a:br>
-              <a:rPr lang="en-US" dirty="0">
-                <a:solidFill>
-                  <a:schemeClr val="tx1">
-                    <a:lumMod val="50000"/>
-                    <a:lumOff val="50000"/>
-                  </a:schemeClr>
-                </a:solidFill>
-              </a:rPr>
+              <a:rPr lang="en-US" dirty="0"/>
             </a:br>
             <a:r>
-              <a:rPr lang="en-US" dirty="0">
-                <a:solidFill>
-                  <a:schemeClr val="tx1">
-                    <a:lumMod val="50000"/>
-                    <a:lumOff val="50000"/>
-                  </a:schemeClr>
-                </a:solidFill>
-              </a:rPr>
+              <a:rPr lang="en-US" dirty="0"/>
               <a:t>y =  2*x + x*x</a:t>
             </a:r>
             <a:br>
-              <a:rPr lang="en-US" dirty="0">
-                <a:solidFill>
-                  <a:schemeClr val="tx1">
-                    <a:lumMod val="50000"/>
-                    <a:lumOff val="50000"/>
-                  </a:schemeClr>
-                </a:solidFill>
-              </a:rPr>
+              <a:rPr lang="en-US" dirty="0"/>
             </a:br>
             <a:r>
-              <a:rPr lang="en-US" dirty="0">
-                <a:solidFill>
-                  <a:schemeClr val="tx1">
-                    <a:lumMod val="50000"/>
-                    <a:lumOff val="50000"/>
-                  </a:schemeClr>
-                </a:solidFill>
-              </a:rPr>
+              <a:rPr lang="en-US" dirty="0"/>
               <a:t>g = </a:t>
             </a:r>
             <a:r>
-              <a:rPr lang="en-US" dirty="0" err="1">
-                <a:solidFill>
-                  <a:schemeClr val="tx1">
-                    <a:lumMod val="50000"/>
-                    <a:lumOff val="50000"/>
-                  </a:schemeClr>
-                </a:solidFill>
-              </a:rPr>
+              <a:rPr lang="en-US" dirty="0" err="1"/>
               <a:t>tf.gradients</a:t>
             </a:r>
             <a:r>
-              <a:rPr lang="en-US" dirty="0">
-                <a:solidFill>
-                  <a:schemeClr val="tx1">
-                    <a:lumMod val="50000"/>
-                    <a:lumOff val="50000"/>
-                  </a:schemeClr>
-                </a:solidFill>
-              </a:rPr>
+              <a:rPr lang="en-US" dirty="0"/>
               <a:t>(x + y, [x, y])</a:t>
             </a:r>
           </a:p>
@@ -15556,58 +15012,23 @@
               <a:buNone/>
             </a:pPr>
             <a:r>
-              <a:rPr lang="en-US" dirty="0" smtClean="0">
-                <a:solidFill>
-                  <a:schemeClr val="tx1">
-                    <a:lumMod val="50000"/>
-                    <a:lumOff val="50000"/>
-                  </a:schemeClr>
-                </a:solidFill>
-              </a:rPr>
+              <a:rPr lang="en-US" dirty="0" smtClean="0"/>
               <a:t>with </a:t>
             </a:r>
             <a:r>
-              <a:rPr lang="en-US" dirty="0" err="1" smtClean="0">
-                <a:solidFill>
-                  <a:schemeClr val="tx1">
-                    <a:lumMod val="50000"/>
-                    <a:lumOff val="50000"/>
-                  </a:schemeClr>
-                </a:solidFill>
-              </a:rPr>
+              <a:rPr lang="en-US" dirty="0" err="1" smtClean="0"/>
               <a:t>tf.Session</a:t>
             </a:r>
             <a:r>
-              <a:rPr lang="en-US" dirty="0" smtClean="0">
-                <a:solidFill>
-                  <a:schemeClr val="tx1">
-                    <a:lumMod val="50000"/>
-                    <a:lumOff val="50000"/>
-                  </a:schemeClr>
-                </a:solidFill>
-              </a:rPr>
+              <a:rPr lang="en-US" dirty="0" smtClean="0"/>
               <a:t>() as </a:t>
             </a:r>
             <a:r>
-              <a:rPr lang="en-US" dirty="0" err="1" smtClean="0">
-                <a:solidFill>
-                  <a:schemeClr val="tx1">
-                    <a:lumMod val="50000"/>
-                    <a:lumOff val="50000"/>
-                  </a:schemeClr>
-                </a:solidFill>
-              </a:rPr>
+              <a:rPr lang="en-US" dirty="0" err="1" smtClean="0"/>
               <a:t>sess</a:t>
             </a:r>
             <a:r>
-              <a:rPr lang="en-US" dirty="0" smtClean="0">
-                <a:solidFill>
-                  <a:schemeClr val="tx1">
-                    <a:lumMod val="50000"/>
-                    <a:lumOff val="50000"/>
-                  </a:schemeClr>
-                </a:solidFill>
-              </a:rPr>
+              <a:rPr lang="en-US" dirty="0" smtClean="0"/>
               <a:t>:</a:t>
             </a:r>
           </a:p>
@@ -15616,79 +15037,30 @@
               <a:buNone/>
             </a:pPr>
             <a:r>
-              <a:rPr lang="en-US" dirty="0">
-                <a:solidFill>
-                  <a:schemeClr val="tx1">
-                    <a:lumMod val="50000"/>
-                    <a:lumOff val="50000"/>
-                  </a:schemeClr>
-                </a:solidFill>
-              </a:rPr>
+              <a:rPr lang="en-US" dirty="0"/>
               <a:t> </a:t>
             </a:r>
             <a:r>
-              <a:rPr lang="en-US" dirty="0" smtClean="0">
-                <a:solidFill>
-                  <a:schemeClr val="tx1">
-                    <a:lumMod val="50000"/>
-                    <a:lumOff val="50000"/>
-                  </a:schemeClr>
-                </a:solidFill>
-              </a:rPr>
+              <a:rPr lang="en-US" dirty="0" smtClean="0"/>
               <a:t>      print </a:t>
             </a:r>
             <a:r>
-              <a:rPr lang="en-US" dirty="0" err="1" smtClean="0">
-                <a:solidFill>
-                  <a:schemeClr val="tx1">
-                    <a:lumMod val="50000"/>
-                    <a:lumOff val="50000"/>
-                  </a:schemeClr>
-                </a:solidFill>
-              </a:rPr>
+              <a:rPr lang="en-US" dirty="0" err="1" smtClean="0"/>
               <a:t>sess.run</a:t>
             </a:r>
             <a:r>
-              <a:rPr lang="en-US" dirty="0" smtClean="0">
-                <a:solidFill>
-                  <a:schemeClr val="tx1">
-                    <a:lumMod val="50000"/>
-                    <a:lumOff val="50000"/>
-                  </a:schemeClr>
-                </a:solidFill>
-              </a:rPr>
+              <a:rPr lang="en-US" dirty="0" smtClean="0"/>
               <a:t>(g, </a:t>
             </a:r>
             <a:r>
-              <a:rPr lang="en-US" dirty="0" err="1" smtClean="0">
-                <a:solidFill>
-                  <a:schemeClr val="tx1">
-                    <a:lumMod val="50000"/>
-                    <a:lumOff val="50000"/>
-                  </a:schemeClr>
-                </a:solidFill>
-              </a:rPr>
+              <a:rPr lang="en-US" dirty="0" err="1" smtClean="0"/>
               <a:t>feed_dict</a:t>
             </a:r>
             <a:r>
-              <a:rPr lang="en-US" dirty="0" smtClean="0">
-                <a:solidFill>
-                  <a:schemeClr val="tx1">
-                    <a:lumMod val="50000"/>
-                    <a:lumOff val="50000"/>
-                  </a:schemeClr>
-                </a:solidFill>
-              </a:rPr>
+              <a:rPr lang="en-US" dirty="0" smtClean="0"/>
               <a:t>={x:1.0})</a:t>
             </a:r>
-            <a:endParaRPr lang="en-US" dirty="0">
-              <a:solidFill>
-                <a:schemeClr val="tx1">
-                  <a:lumMod val="50000"/>
-                  <a:lumOff val="50000"/>
-                </a:schemeClr>
-              </a:solidFill>
-            </a:endParaRPr>
+            <a:endParaRPr lang="en-US" dirty="0"/>
           </a:p>
         </p:txBody>
       </p:sp>
@@ -16846,629 +16218,237 @@
               <a:buNone/>
             </a:pPr>
             <a:r>
-              <a:rPr lang="en-US" sz="1800" dirty="0">
-                <a:solidFill>
-                  <a:schemeClr val="tx1">
-                    <a:lumMod val="50000"/>
-                    <a:lumOff val="50000"/>
-                  </a:schemeClr>
-                </a:solidFill>
-              </a:rPr>
+              <a:rPr lang="en-US" sz="1800" dirty="0"/>
               <a:t>import </a:t>
             </a:r>
             <a:r>
-              <a:rPr lang="en-US" sz="1800" dirty="0" err="1">
-                <a:solidFill>
-                  <a:schemeClr val="tx1">
-                    <a:lumMod val="50000"/>
-                    <a:lumOff val="50000"/>
-                  </a:schemeClr>
-                </a:solidFill>
-              </a:rPr>
+              <a:rPr lang="en-US" sz="1800" dirty="0" err="1"/>
               <a:t>tensorflow</a:t>
             </a:r>
             <a:r>
-              <a:rPr lang="en-US" sz="1800" dirty="0">
-                <a:solidFill>
-                  <a:schemeClr val="tx1">
-                    <a:lumMod val="50000"/>
-                    <a:lumOff val="50000"/>
-                  </a:schemeClr>
-                </a:solidFill>
-              </a:rPr>
+              <a:rPr lang="en-US" sz="1800" dirty="0"/>
               <a:t> as </a:t>
             </a:r>
             <a:r>
-              <a:rPr lang="en-US" sz="1800" dirty="0" err="1">
-                <a:solidFill>
-                  <a:schemeClr val="tx1">
-                    <a:lumMod val="50000"/>
-                    <a:lumOff val="50000"/>
-                  </a:schemeClr>
-                </a:solidFill>
-              </a:rPr>
+              <a:rPr lang="en-US" sz="1800" dirty="0" err="1"/>
               <a:t>tf</a:t>
             </a:r>
             <a:r>
-              <a:rPr lang="en-US" sz="1800" dirty="0">
-                <a:solidFill>
-                  <a:schemeClr val="tx1">
-                    <a:lumMod val="50000"/>
-                    <a:lumOff val="50000"/>
-                  </a:schemeClr>
-                </a:solidFill>
-              </a:rPr>
+              <a:rPr lang="en-US" sz="1800" dirty="0"/>
               <a:t/>
             </a:r>
             <a:br>
-              <a:rPr lang="en-US" sz="1800" dirty="0">
-                <a:solidFill>
-                  <a:schemeClr val="tx1">
-                    <a:lumMod val="50000"/>
-                    <a:lumOff val="50000"/>
-                  </a:schemeClr>
-                </a:solidFill>
-              </a:rPr>
+              <a:rPr lang="en-US" sz="1800" dirty="0"/>
             </a:br>
-            <a:endParaRPr lang="en-US" sz="1800" dirty="0">
-              <a:solidFill>
-                <a:schemeClr val="tx1">
-                  <a:lumMod val="50000"/>
-                  <a:lumOff val="50000"/>
-                </a:schemeClr>
-              </a:solidFill>
-            </a:endParaRPr>
+            <a:endParaRPr lang="en-US" sz="1800" dirty="0"/>
           </a:p>
           <a:p>
             <a:pPr marL="0" indent="0">
               <a:buNone/>
             </a:pPr>
             <a:r>
-              <a:rPr lang="en-US" sz="1800" dirty="0">
-                <a:solidFill>
-                  <a:schemeClr val="tx1">
-                    <a:lumMod val="50000"/>
-                    <a:lumOff val="50000"/>
-                  </a:schemeClr>
-                </a:solidFill>
-              </a:rPr>
+              <a:rPr lang="en-US" sz="1800" dirty="0"/>
               <a:t>from </a:t>
             </a:r>
             <a:r>
-              <a:rPr lang="en-US" sz="1800" dirty="0" err="1">
-                <a:solidFill>
-                  <a:schemeClr val="tx1">
-                    <a:lumMod val="50000"/>
-                    <a:lumOff val="50000"/>
-                  </a:schemeClr>
-                </a:solidFill>
-              </a:rPr>
+              <a:rPr lang="en-US" sz="1800" dirty="0" err="1"/>
               <a:t>tensorflow.python.keras.models</a:t>
             </a:r>
             <a:r>
-              <a:rPr lang="en-US" sz="1800" dirty="0">
-                <a:solidFill>
-                  <a:schemeClr val="tx1">
-                    <a:lumMod val="50000"/>
-                    <a:lumOff val="50000"/>
-                  </a:schemeClr>
-                </a:solidFill>
-              </a:rPr>
+              <a:rPr lang="en-US" sz="1800" dirty="0"/>
               <a:t> import Sequential </a:t>
             </a:r>
             <a:br>
-              <a:rPr lang="en-US" sz="1800" dirty="0">
-                <a:solidFill>
-                  <a:schemeClr val="tx1">
-                    <a:lumMod val="50000"/>
-                    <a:lumOff val="50000"/>
-                  </a:schemeClr>
-                </a:solidFill>
-              </a:rPr>
+              <a:rPr lang="en-US" sz="1800" dirty="0"/>
             </a:br>
             <a:r>
-              <a:rPr lang="en-US" sz="1800" dirty="0">
-                <a:solidFill>
-                  <a:schemeClr val="tx1">
-                    <a:lumMod val="50000"/>
-                    <a:lumOff val="50000"/>
-                  </a:schemeClr>
-                </a:solidFill>
-              </a:rPr>
+              <a:rPr lang="en-US" sz="1800" dirty="0"/>
               <a:t>from </a:t>
             </a:r>
             <a:r>
-              <a:rPr lang="en-US" sz="1800" dirty="0" err="1">
-                <a:solidFill>
-                  <a:schemeClr val="tx1">
-                    <a:lumMod val="50000"/>
-                    <a:lumOff val="50000"/>
-                  </a:schemeClr>
-                </a:solidFill>
-              </a:rPr>
+              <a:rPr lang="en-US" sz="1800" dirty="0" err="1"/>
               <a:t>tensorflow.python.keras.layers</a:t>
             </a:r>
             <a:r>
-              <a:rPr lang="en-US" sz="1800" dirty="0">
-                <a:solidFill>
-                  <a:schemeClr val="tx1">
-                    <a:lumMod val="50000"/>
-                    <a:lumOff val="50000"/>
-                  </a:schemeClr>
-                </a:solidFill>
-              </a:rPr>
+              <a:rPr lang="en-US" sz="1800" dirty="0"/>
               <a:t> import Dense, Activation </a:t>
             </a:r>
             <a:br>
-              <a:rPr lang="en-US" sz="1800" dirty="0">
-                <a:solidFill>
-                  <a:schemeClr val="tx1">
-                    <a:lumMod val="50000"/>
-                    <a:lumOff val="50000"/>
-                  </a:schemeClr>
-                </a:solidFill>
-              </a:rPr>
+              <a:rPr lang="en-US" sz="1800" dirty="0"/>
             </a:br>
-            <a:endParaRPr lang="en-US" sz="1800" dirty="0">
-              <a:solidFill>
-                <a:schemeClr val="tx1">
-                  <a:lumMod val="50000"/>
-                  <a:lumOff val="50000"/>
-                </a:schemeClr>
-              </a:solidFill>
-            </a:endParaRPr>
+            <a:endParaRPr lang="en-US" sz="1800" dirty="0"/>
           </a:p>
           <a:p>
             <a:pPr marL="0" indent="0">
               <a:buNone/>
             </a:pPr>
             <a:r>
-              <a:rPr lang="en-US" sz="1800" dirty="0">
-                <a:solidFill>
-                  <a:schemeClr val="tx1">
-                    <a:lumMod val="50000"/>
-                    <a:lumOff val="50000"/>
-                  </a:schemeClr>
-                </a:solidFill>
-              </a:rPr>
+              <a:rPr lang="en-US" sz="1800" dirty="0"/>
               <a:t>model = Sequential() </a:t>
-            </a:r>
-            <a:br>
-              <a:rPr lang="en-US" sz="1800" dirty="0">
-                <a:solidFill>
-                  <a:schemeClr val="tx1">
-                    <a:lumMod val="50000"/>
-                    <a:lumOff val="50000"/>
-                  </a:schemeClr>
-                </a:solidFill>
-              </a:rPr>
-            </a:br>
-            <a:r>
-              <a:rPr lang="en-US" sz="1800" dirty="0" err="1">
-                <a:solidFill>
-                  <a:schemeClr val="tx1">
-                    <a:lumMod val="50000"/>
-                    <a:lumOff val="50000"/>
-                  </a:schemeClr>
-                </a:solidFill>
-              </a:rPr>
-              <a:t>model.add</a:t>
-            </a:r>
-            <a:r>
-              <a:rPr lang="en-US" sz="1800" dirty="0">
-                <a:solidFill>
-                  <a:schemeClr val="tx1">
-                    <a:lumMod val="50000"/>
-                    <a:lumOff val="50000"/>
-                  </a:schemeClr>
-                </a:solidFill>
-              </a:rPr>
-              <a:t>(Dense(10, </a:t>
-            </a:r>
-            <a:r>
-              <a:rPr lang="en-US" sz="1800" dirty="0" err="1">
-                <a:solidFill>
-                  <a:schemeClr val="tx1">
-                    <a:lumMod val="50000"/>
-                    <a:lumOff val="50000"/>
-                  </a:schemeClr>
-                </a:solidFill>
-              </a:rPr>
-              <a:t>input_dim</a:t>
-            </a:r>
-            <a:r>
-              <a:rPr lang="en-US" sz="1800" dirty="0">
-                <a:solidFill>
-                  <a:schemeClr val="tx1">
-                    <a:lumMod val="50000"/>
-                    <a:lumOff val="50000"/>
-                  </a:schemeClr>
-                </a:solidFill>
-              </a:rPr>
-              <a:t>=100, activation='</a:t>
-            </a:r>
-            <a:r>
-              <a:rPr lang="en-US" sz="1800" dirty="0" err="1">
-                <a:solidFill>
-                  <a:schemeClr val="tx1">
-                    <a:lumMod val="50000"/>
-                    <a:lumOff val="50000"/>
-                  </a:schemeClr>
-                </a:solidFill>
-              </a:rPr>
-              <a:t>softmax</a:t>
-            </a:r>
-            <a:r>
-              <a:rPr lang="en-US" sz="1800" dirty="0">
-                <a:solidFill>
-                  <a:schemeClr val="tx1">
-                    <a:lumMod val="50000"/>
-                    <a:lumOff val="50000"/>
-                  </a:schemeClr>
-                </a:solidFill>
-              </a:rPr>
-              <a:t>')) </a:t>
-            </a:r>
-            <a:br>
-              <a:rPr lang="en-US" sz="1800" dirty="0">
-                <a:solidFill>
-                  <a:schemeClr val="tx1">
-                    <a:lumMod val="50000"/>
-                    <a:lumOff val="50000"/>
-                  </a:schemeClr>
-                </a:solidFill>
-              </a:rPr>
-            </a:br>
-            <a:r>
-              <a:rPr lang="en-US" sz="1800" dirty="0" err="1">
-                <a:solidFill>
-                  <a:schemeClr val="tx1">
-                    <a:lumMod val="50000"/>
-                    <a:lumOff val="50000"/>
-                  </a:schemeClr>
-                </a:solidFill>
-              </a:rPr>
-              <a:t>model.compile</a:t>
-            </a:r>
-            <a:r>
-              <a:rPr lang="en-US" sz="1800" dirty="0">
-                <a:solidFill>
-                  <a:schemeClr val="tx1">
-                    <a:lumMod val="50000"/>
-                    <a:lumOff val="50000"/>
-                  </a:schemeClr>
-                </a:solidFill>
-              </a:rPr>
-              <a:t>(optimizer='</a:t>
-            </a:r>
-            <a:r>
-              <a:rPr lang="en-US" sz="1800" dirty="0" err="1">
-                <a:solidFill>
-                  <a:schemeClr val="tx1">
-                    <a:lumMod val="50000"/>
-                    <a:lumOff val="50000"/>
-                  </a:schemeClr>
-                </a:solidFill>
-              </a:rPr>
-              <a:t>sgd</a:t>
-            </a:r>
-            <a:r>
-              <a:rPr lang="en-US" sz="1800" dirty="0">
-                <a:solidFill>
-                  <a:schemeClr val="tx1">
-                    <a:lumMod val="50000"/>
-                    <a:lumOff val="50000"/>
-                  </a:schemeClr>
-                </a:solidFill>
-              </a:rPr>
-              <a:t>', loss='</a:t>
-            </a:r>
-            <a:r>
-              <a:rPr lang="en-US" sz="1800" dirty="0" err="1">
-                <a:solidFill>
-                  <a:schemeClr val="tx1">
-                    <a:lumMod val="50000"/>
-                    <a:lumOff val="50000"/>
-                  </a:schemeClr>
-                </a:solidFill>
-              </a:rPr>
-              <a:t>categorical_crossentropy</a:t>
-            </a:r>
-            <a:r>
-              <a:rPr lang="en-US" sz="1800" dirty="0">
-                <a:solidFill>
-                  <a:schemeClr val="tx1">
-                    <a:lumMod val="50000"/>
-                    <a:lumOff val="50000"/>
-                  </a:schemeClr>
-                </a:solidFill>
-              </a:rPr>
-              <a:t>', metrics=['accuracy']) </a:t>
-            </a:r>
-            <a:br>
-              <a:rPr lang="en-US" sz="1800" dirty="0">
-                <a:solidFill>
-                  <a:schemeClr val="tx1">
-                    <a:lumMod val="50000"/>
-                    <a:lumOff val="50000"/>
-                  </a:schemeClr>
-                </a:solidFill>
-              </a:rPr>
-            </a:br>
-            <a:r>
-              <a:rPr lang="en-US" sz="1800" dirty="0">
-                <a:solidFill>
-                  <a:schemeClr val="tx1">
-                    <a:lumMod val="50000"/>
-                    <a:lumOff val="50000"/>
-                  </a:schemeClr>
-                </a:solidFill>
-              </a:rPr>
-              <a:t>history = </a:t>
-            </a:r>
-            <a:r>
-              <a:rPr lang="en-US" sz="1800" dirty="0" err="1">
-                <a:solidFill>
-                  <a:schemeClr val="tx1">
-                    <a:lumMod val="50000"/>
-                    <a:lumOff val="50000"/>
-                  </a:schemeClr>
-                </a:solidFill>
-              </a:rPr>
-              <a:t>model.fit</a:t>
-            </a:r>
-            <a:r>
-              <a:rPr lang="en-US" sz="1800" dirty="0">
-                <a:solidFill>
-                  <a:schemeClr val="tx1">
-                    <a:lumMod val="50000"/>
-                    <a:lumOff val="50000"/>
-                  </a:schemeClr>
-                </a:solidFill>
-              </a:rPr>
-              <a:t>(</a:t>
-            </a:r>
-            <a:r>
-              <a:rPr lang="en-US" sz="1800" dirty="0" err="1">
-                <a:solidFill>
-                  <a:schemeClr val="tx1">
-                    <a:lumMod val="50000"/>
-                    <a:lumOff val="50000"/>
-                  </a:schemeClr>
-                </a:solidFill>
-              </a:rPr>
-              <a:t>X_train</a:t>
-            </a:r>
-            <a:r>
-              <a:rPr lang="en-US" sz="1800" dirty="0">
-                <a:solidFill>
-                  <a:schemeClr val="tx1">
-                    <a:lumMod val="50000"/>
-                    <a:lumOff val="50000"/>
-                  </a:schemeClr>
-                </a:solidFill>
-              </a:rPr>
-              <a:t>, </a:t>
-            </a:r>
-            <a:r>
-              <a:rPr lang="en-US" sz="1800" dirty="0" err="1">
-                <a:solidFill>
-                  <a:schemeClr val="tx1">
-                    <a:lumMod val="50000"/>
-                    <a:lumOff val="50000"/>
-                  </a:schemeClr>
-                </a:solidFill>
-              </a:rPr>
-              <a:t>Y_train</a:t>
-            </a:r>
-            <a:r>
-              <a:rPr lang="en-US" sz="1800" dirty="0">
-                <a:solidFill>
-                  <a:schemeClr val="tx1">
-                    <a:lumMod val="50000"/>
-                    <a:lumOff val="50000"/>
-                  </a:schemeClr>
-                </a:solidFill>
-              </a:rPr>
-              <a:t>, 128, </a:t>
-            </a:r>
-            <a:r>
-              <a:rPr lang="en-US" sz="1800" dirty="0" err="1">
-                <a:solidFill>
-                  <a:schemeClr val="tx1">
-                    <a:lumMod val="50000"/>
-                    <a:lumOff val="50000"/>
-                  </a:schemeClr>
-                </a:solidFill>
-              </a:rPr>
-              <a:t>nb_epoch</a:t>
-            </a:r>
-            <a:r>
-              <a:rPr lang="en-US" sz="1800" dirty="0">
-                <a:solidFill>
-                  <a:schemeClr val="tx1">
-                    <a:lumMod val="50000"/>
-                    <a:lumOff val="50000"/>
-                  </a:schemeClr>
-                </a:solidFill>
-              </a:rPr>
-              <a:t>=5,  </a:t>
-            </a:r>
-            <a:r>
-              <a:rPr lang="en-US" sz="1800" dirty="0" err="1">
-                <a:solidFill>
-                  <a:schemeClr val="tx1">
-                    <a:lumMod val="50000"/>
-                    <a:lumOff val="50000"/>
-                  </a:schemeClr>
-                </a:solidFill>
-              </a:rPr>
-              <a:t>validation_data</a:t>
-            </a:r>
-            <a:r>
-              <a:rPr lang="en-US" sz="1800" dirty="0">
-                <a:solidFill>
-                  <a:schemeClr val="tx1">
-                    <a:lumMod val="50000"/>
-                    <a:lumOff val="50000"/>
-                  </a:schemeClr>
-                </a:solidFill>
-              </a:rPr>
-              <a:t>=(</a:t>
-            </a:r>
-            <a:r>
-              <a:rPr lang="en-US" sz="1800" dirty="0" err="1">
-                <a:solidFill>
-                  <a:schemeClr val="tx1">
-                    <a:lumMod val="50000"/>
-                    <a:lumOff val="50000"/>
-                  </a:schemeClr>
-                </a:solidFill>
-              </a:rPr>
-              <a:t>X_test</a:t>
-            </a:r>
-            <a:r>
-              <a:rPr lang="en-US" sz="1800" dirty="0">
-                <a:solidFill>
-                  <a:schemeClr val="tx1">
-                    <a:lumMod val="50000"/>
-                    <a:lumOff val="50000"/>
-                  </a:schemeClr>
-                </a:solidFill>
-              </a:rPr>
-              <a:t>, </a:t>
-            </a:r>
-            <a:r>
-              <a:rPr lang="en-US" sz="1800" dirty="0" err="1">
-                <a:solidFill>
-                  <a:schemeClr val="tx1">
-                    <a:lumMod val="50000"/>
-                    <a:lumOff val="50000"/>
-                  </a:schemeClr>
-                </a:solidFill>
-              </a:rPr>
-              <a:t>Y_test</a:t>
-            </a:r>
-            <a:r>
-              <a:rPr lang="en-US" sz="1800" dirty="0">
-                <a:solidFill>
-                  <a:schemeClr val="tx1">
-                    <a:lumMod val="50000"/>
-                    <a:lumOff val="50000"/>
-                  </a:schemeClr>
-                </a:solidFill>
-              </a:rPr>
-              <a:t>)) </a:t>
-            </a:r>
-            <a:br>
-              <a:rPr lang="en-US" sz="1800" dirty="0">
-                <a:solidFill>
-                  <a:schemeClr val="tx1">
-                    <a:lumMod val="50000"/>
-                    <a:lumOff val="50000"/>
-                  </a:schemeClr>
-                </a:solidFill>
-              </a:rPr>
-            </a:br>
-            <a:r>
-              <a:rPr lang="en-US" sz="1800" dirty="0">
-                <a:solidFill>
-                  <a:schemeClr val="tx1">
-                    <a:lumMod val="50000"/>
-                    <a:lumOff val="50000"/>
-                  </a:schemeClr>
-                </a:solidFill>
-              </a:rPr>
-              <a:t>score = </a:t>
-            </a:r>
-            <a:r>
-              <a:rPr lang="en-US" sz="1800" dirty="0" err="1">
-                <a:solidFill>
-                  <a:schemeClr val="tx1">
-                    <a:lumMod val="50000"/>
-                    <a:lumOff val="50000"/>
-                  </a:schemeClr>
-                </a:solidFill>
-              </a:rPr>
-              <a:t>model.evaluate</a:t>
-            </a:r>
-            <a:r>
-              <a:rPr lang="en-US" sz="1800" dirty="0">
-                <a:solidFill>
-                  <a:schemeClr val="tx1">
-                    <a:lumMod val="50000"/>
-                    <a:lumOff val="50000"/>
-                  </a:schemeClr>
-                </a:solidFill>
-              </a:rPr>
-              <a:t>(</a:t>
-            </a:r>
-            <a:r>
-              <a:rPr lang="en-US" sz="1800" dirty="0" err="1">
-                <a:solidFill>
-                  <a:schemeClr val="tx1">
-                    <a:lumMod val="50000"/>
-                    <a:lumOff val="50000"/>
-                  </a:schemeClr>
-                </a:solidFill>
-              </a:rPr>
-              <a:t>X_test</a:t>
-            </a:r>
-            <a:r>
-              <a:rPr lang="en-US" sz="1800" dirty="0">
-                <a:solidFill>
-                  <a:schemeClr val="tx1">
-                    <a:lumMod val="50000"/>
-                    <a:lumOff val="50000"/>
-                  </a:schemeClr>
-                </a:solidFill>
-              </a:rPr>
-              <a:t>, </a:t>
-            </a:r>
-            <a:r>
-              <a:rPr lang="en-US" sz="1800" dirty="0" err="1" smtClean="0">
-                <a:solidFill>
-                  <a:schemeClr val="tx1">
-                    <a:lumMod val="50000"/>
-                    <a:lumOff val="50000"/>
-                  </a:schemeClr>
-                </a:solidFill>
-              </a:rPr>
-              <a:t>Y_test</a:t>
-            </a:r>
-            <a:r>
-              <a:rPr lang="en-US" sz="1800" dirty="0" smtClean="0">
-                <a:solidFill>
-                  <a:schemeClr val="tx1">
-                    <a:lumMod val="50000"/>
-                    <a:lumOff val="50000"/>
-                  </a:schemeClr>
-                </a:solidFill>
-              </a:rPr>
-              <a:t>) </a:t>
-            </a:r>
-            <a:r>
-              <a:rPr lang="en-US" sz="1800" dirty="0"/>
-              <a:t/>
             </a:r>
             <a:br>
               <a:rPr lang="en-US" sz="1800" dirty="0"/>
             </a:br>
             <a:r>
+              <a:rPr lang="en-US" sz="1800" dirty="0" err="1"/>
+              <a:t>model.add</a:t>
+            </a:r>
+            <a:r>
               <a:rPr lang="en-US" sz="1800" dirty="0"/>
-              <a:t/>
+              <a:t>(Dense(10, </a:t>
+            </a:r>
+            <a:r>
+              <a:rPr lang="en-US" sz="1800" dirty="0" err="1"/>
+              <a:t>input_dim</a:t>
+            </a:r>
+            <a:r>
+              <a:rPr lang="en-US" sz="1800" dirty="0"/>
+              <a:t>=100, activation='</a:t>
+            </a:r>
+            <a:r>
+              <a:rPr lang="en-US" sz="1800" dirty="0" err="1"/>
+              <a:t>softmax</a:t>
+            </a:r>
+            <a:r>
+              <a:rPr lang="en-US" sz="1800" dirty="0"/>
+              <a:t>')) </a:t>
             </a:r>
             <a:br>
               <a:rPr lang="en-US" sz="1800" dirty="0"/>
             </a:br>
-            <a:endParaRPr lang="en-US" sz="1800" dirty="0">
-              <a:solidFill>
-                <a:schemeClr val="tx1">
-                  <a:lumMod val="50000"/>
-                  <a:lumOff val="50000"/>
-                </a:schemeClr>
-              </a:solidFill>
-            </a:endParaRPr>
+            <a:r>
+              <a:rPr lang="en-US" sz="1800" dirty="0" err="1"/>
+              <a:t>model.compile</a:t>
+            </a:r>
+            <a:r>
+              <a:rPr lang="en-US" sz="1800" dirty="0"/>
+              <a:t>(optimizer='</a:t>
+            </a:r>
+            <a:r>
+              <a:rPr lang="en-US" sz="1800" dirty="0" err="1"/>
+              <a:t>sgd</a:t>
+            </a:r>
+            <a:r>
+              <a:rPr lang="en-US" sz="1800" dirty="0"/>
+              <a:t>', loss='</a:t>
+            </a:r>
+            <a:r>
+              <a:rPr lang="en-US" sz="1800" dirty="0" err="1"/>
+              <a:t>categorical_crossentropy</a:t>
+            </a:r>
+            <a:r>
+              <a:rPr lang="en-US" sz="1800" dirty="0"/>
+              <a:t>', metrics=['accuracy']) </a:t>
+            </a:r>
+            <a:br>
+              <a:rPr lang="en-US" sz="1800" dirty="0"/>
+            </a:br>
+            <a:r>
+              <a:rPr lang="en-US" sz="1800" dirty="0"/>
+              <a:t>history = </a:t>
+            </a:r>
+            <a:r>
+              <a:rPr lang="en-US" sz="1800" dirty="0" err="1"/>
+              <a:t>model.fit</a:t>
+            </a:r>
+            <a:r>
+              <a:rPr lang="en-US" sz="1800" dirty="0"/>
+              <a:t>(</a:t>
+            </a:r>
+            <a:r>
+              <a:rPr lang="en-US" sz="1800" dirty="0" err="1"/>
+              <a:t>X_train</a:t>
+            </a:r>
+            <a:r>
+              <a:rPr lang="en-US" sz="1800" dirty="0"/>
+              <a:t>, </a:t>
+            </a:r>
+            <a:r>
+              <a:rPr lang="en-US" sz="1800" dirty="0" err="1"/>
+              <a:t>Y_train</a:t>
+            </a:r>
+            <a:r>
+              <a:rPr lang="en-US" sz="1800" dirty="0"/>
+              <a:t>, 128, </a:t>
+            </a:r>
+            <a:r>
+              <a:rPr lang="en-US" sz="1800" dirty="0" err="1"/>
+              <a:t>nb_epoch</a:t>
+            </a:r>
+            <a:r>
+              <a:rPr lang="en-US" sz="1800" dirty="0"/>
+              <a:t>=5,  </a:t>
+            </a:r>
+            <a:r>
+              <a:rPr lang="en-US" sz="1800" dirty="0" err="1"/>
+              <a:t>validation_data</a:t>
+            </a:r>
+            <a:r>
+              <a:rPr lang="en-US" sz="1800" dirty="0"/>
+              <a:t>=(</a:t>
+            </a:r>
+            <a:r>
+              <a:rPr lang="en-US" sz="1800" dirty="0" err="1"/>
+              <a:t>X_test</a:t>
+            </a:r>
+            <a:r>
+              <a:rPr lang="en-US" sz="1800" dirty="0"/>
+              <a:t>, </a:t>
+            </a:r>
+            <a:r>
+              <a:rPr lang="en-US" sz="1800" dirty="0" err="1"/>
+              <a:t>Y_test</a:t>
+            </a:r>
+            <a:r>
+              <a:rPr lang="en-US" sz="1800" dirty="0"/>
+              <a:t>)) </a:t>
+            </a:r>
+            <a:br>
+              <a:rPr lang="en-US" sz="1800" dirty="0"/>
+            </a:br>
+            <a:r>
+              <a:rPr lang="en-US" sz="1800" dirty="0"/>
+              <a:t>score = </a:t>
+            </a:r>
+            <a:r>
+              <a:rPr lang="en-US" sz="1800" dirty="0" err="1"/>
+              <a:t>model.evaluate</a:t>
+            </a:r>
+            <a:r>
+              <a:rPr lang="en-US" sz="1800" dirty="0"/>
+              <a:t>(</a:t>
+            </a:r>
+            <a:r>
+              <a:rPr lang="en-US" sz="1800" dirty="0" err="1"/>
+              <a:t>X_test</a:t>
+            </a:r>
+            <a:r>
+              <a:rPr lang="en-US" sz="1800" dirty="0"/>
+              <a:t>, </a:t>
+            </a:r>
+            <a:r>
+              <a:rPr lang="en-US" sz="1800" dirty="0" err="1" smtClean="0"/>
+              <a:t>Y_test</a:t>
+            </a:r>
+            <a:r>
+              <a:rPr lang="en-US" sz="1800" dirty="0" smtClean="0"/>
+              <a:t>) </a:t>
+            </a:r>
+            <a:r>
+              <a:rPr lang="en-US" sz="1800" dirty="0"/>
+              <a:t/>
+            </a:r>
+            <a:br>
+              <a:rPr lang="en-US" sz="1800" dirty="0"/>
+            </a:br>
+            <a:r>
+              <a:rPr lang="en-US" sz="1800" dirty="0"/>
+              <a:t/>
+            </a:r>
+            <a:br>
+              <a:rPr lang="en-US" sz="1800" dirty="0"/>
+            </a:br>
+            <a:endParaRPr lang="en-US" sz="1800" dirty="0"/>
           </a:p>
         </p:txBody>
       </p:sp>

</xml_diff>